<commit_message>
Se agregan gráficos de mapas y se finaliza la presentación
</commit_message>
<xml_diff>
--- a/Predicción de Precios Inmobiliarios.pptx
+++ b/Predicción de Precios Inmobiliarios.pptx
@@ -21,22 +21,26 @@
     <p:sldId id="266" r:id="rId16"/>
     <p:sldId id="267" r:id="rId17"/>
     <p:sldId id="268" r:id="rId18"/>
+    <p:sldId id="269" r:id="rId19"/>
+    <p:sldId id="270" r:id="rId20"/>
+    <p:sldId id="271" r:id="rId21"/>
+    <p:sldId id="272" r:id="rId22"/>
+    <p:sldId id="273" r:id="rId23"/>
+    <p:sldId id="274" r:id="rId24"/>
+    <p:sldId id="275" r:id="rId25"/>
+    <p:sldId id="276" r:id="rId26"/>
+    <p:sldId id="277" r:id="rId27"/>
+    <p:sldId id="278" r:id="rId28"/>
   </p:sldIdLst>
   <p:sldSz cy="5143500" cx="9144000"/>
   <p:notesSz cx="6858000" cy="9144000"/>
   <p:embeddedFontLst>
     <p:embeddedFont>
       <p:font typeface="Proxima Nova"/>
-      <p:regular r:id="rId19"/>
-      <p:bold r:id="rId20"/>
-      <p:italic r:id="rId21"/>
-      <p:boldItalic r:id="rId22"/>
-    </p:embeddedFont>
-    <p:embeddedFont>
-      <p:font typeface="Proxima Nova Semibold"/>
-      <p:regular r:id="rId23"/>
-      <p:bold r:id="rId24"/>
-      <p:boldItalic r:id="rId25"/>
+      <p:regular r:id="rId29"/>
+      <p:bold r:id="rId30"/>
+      <p:italic r:id="rId31"/>
+      <p:boldItalic r:id="rId32"/>
     </p:embeddedFont>
   </p:embeddedFontLst>
   <p:defaultTextStyle>
@@ -817,7 +821,7 @@
   <p:cSld>
     <p:spTree>
       <p:nvGrpSpPr>
-        <p:cNvPr id="119" name="Shape 119"/>
+        <p:cNvPr id="120" name="Shape 120"/>
         <p:cNvGrpSpPr/>
         <p:nvPr/>
       </p:nvGrpSpPr>
@@ -831,7 +835,7 @@
       </p:grpSpPr>
       <p:sp>
         <p:nvSpPr>
-          <p:cNvPr id="120" name="Google Shape;120;g277f6627ff2_0_68:notes"/>
+          <p:cNvPr id="121" name="Google Shape;121;g277f6627ff2_0_68:notes"/>
           <p:cNvSpPr/>
           <p:nvPr>
             <p:ph idx="2" type="sldImg"/>
@@ -866,7 +870,7 @@
       </p:sp>
       <p:sp>
         <p:nvSpPr>
-          <p:cNvPr id="121" name="Google Shape;121;g277f6627ff2_0_68:notes"/>
+          <p:cNvPr id="122" name="Google Shape;122;g277f6627ff2_0_68:notes"/>
           <p:cNvSpPr txBox="1"/>
           <p:nvPr>
             <p:ph idx="1" type="body"/>
@@ -916,7 +920,7 @@
   <p:cSld>
     <p:spTree>
       <p:nvGrpSpPr>
-        <p:cNvPr id="126" name="Shape 126"/>
+        <p:cNvPr id="127" name="Shape 127"/>
         <p:cNvGrpSpPr/>
         <p:nvPr/>
       </p:nvGrpSpPr>
@@ -930,7 +934,7 @@
       </p:grpSpPr>
       <p:sp>
         <p:nvSpPr>
-          <p:cNvPr id="127" name="Google Shape;127;g278ac098797_0_17:notes"/>
+          <p:cNvPr id="128" name="Google Shape;128;g278ac098797_0_17:notes"/>
           <p:cNvSpPr/>
           <p:nvPr>
             <p:ph idx="2" type="sldImg"/>
@@ -965,7 +969,7 @@
       </p:sp>
       <p:sp>
         <p:nvSpPr>
-          <p:cNvPr id="128" name="Google Shape;128;g278ac098797_0_17:notes"/>
+          <p:cNvPr id="129" name="Google Shape;129;g278ac098797_0_17:notes"/>
           <p:cNvSpPr txBox="1"/>
           <p:nvPr>
             <p:ph idx="1" type="body"/>
@@ -1015,7 +1019,7 @@
   <p:cSld>
     <p:spTree>
       <p:nvGrpSpPr>
-        <p:cNvPr id="133" name="Shape 133"/>
+        <p:cNvPr id="134" name="Shape 134"/>
         <p:cNvGrpSpPr/>
         <p:nvPr/>
       </p:nvGrpSpPr>
@@ -1029,7 +1033,7 @@
       </p:grpSpPr>
       <p:sp>
         <p:nvSpPr>
-          <p:cNvPr id="134" name="Google Shape;134;g278ac098797_0_23:notes"/>
+          <p:cNvPr id="135" name="Google Shape;135;g278ac098797_0_23:notes"/>
           <p:cNvSpPr/>
           <p:nvPr>
             <p:ph idx="2" type="sldImg"/>
@@ -1064,7 +1068,7 @@
       </p:sp>
       <p:sp>
         <p:nvSpPr>
-          <p:cNvPr id="135" name="Google Shape;135;g278ac098797_0_23:notes"/>
+          <p:cNvPr id="136" name="Google Shape;136;g278ac098797_0_23:notes"/>
           <p:cNvSpPr txBox="1"/>
           <p:nvPr>
             <p:ph idx="1" type="body"/>
@@ -1114,7 +1118,7 @@
   <p:cSld>
     <p:spTree>
       <p:nvGrpSpPr>
-        <p:cNvPr id="139" name="Shape 139"/>
+        <p:cNvPr id="140" name="Shape 140"/>
         <p:cNvGrpSpPr/>
         <p:nvPr/>
       </p:nvGrpSpPr>
@@ -1128,7 +1132,7 @@
       </p:grpSpPr>
       <p:sp>
         <p:nvSpPr>
-          <p:cNvPr id="140" name="Google Shape;140;g278ac098797_0_35:notes"/>
+          <p:cNvPr id="141" name="Google Shape;141;g278ac098797_0_35:notes"/>
           <p:cNvSpPr/>
           <p:nvPr>
             <p:ph idx="2" type="sldImg"/>
@@ -1163,7 +1167,601 @@
       </p:sp>
       <p:sp>
         <p:nvSpPr>
-          <p:cNvPr id="141" name="Google Shape;141;g278ac098797_0_35:notes"/>
+          <p:cNvPr id="142" name="Google Shape;142;g278ac098797_0_35:notes"/>
+          <p:cNvSpPr txBox="1"/>
+          <p:nvPr>
+            <p:ph idx="1" type="body"/>
+          </p:nvPr>
+        </p:nvSpPr>
+        <p:spPr>
+          <a:xfrm>
+            <a:off x="685800" y="4343400"/>
+            <a:ext cx="5486400" cy="4114800"/>
+          </a:xfrm>
+          <a:prstGeom prst="rect">
+            <a:avLst/>
+          </a:prstGeom>
+        </p:spPr>
+        <p:txBody>
+          <a:bodyPr anchorCtr="0" anchor="t" bIns="91425" lIns="91425" spcFirstLastPara="1" rIns="91425" wrap="square" tIns="91425">
+            <a:noAutofit/>
+          </a:bodyPr>
+          <a:lstStyle/>
+          <a:p>
+            <a:pPr indent="0" lvl="0" marL="0" rtl="0" algn="l">
+              <a:spcBef>
+                <a:spcPts val="0"/>
+              </a:spcBef>
+              <a:spcAft>
+                <a:spcPts val="0"/>
+              </a:spcAft>
+              <a:buNone/>
+            </a:pPr>
+            <a:r>
+              <a:t/>
+            </a:r>
+            <a:endParaRPr/>
+          </a:p>
+        </p:txBody>
+      </p:sp>
+    </p:spTree>
+  </p:cSld>
+  <p:clrMapOvr>
+    <a:masterClrMapping/>
+  </p:clrMapOvr>
+</p:notes>
+</file>
+
+<file path=ppt/notesSlides/notesSlide14.xml><?xml version="1.0" encoding="utf-8"?>
+<p:notes xmlns:a="http://schemas.openxmlformats.org/drawingml/2006/main" xmlns:r="http://schemas.openxmlformats.org/officeDocument/2006/relationships" xmlns:mc="http://schemas.openxmlformats.org/markup-compatibility/2006" xmlns:mv="urn:schemas-microsoft-com:mac:vml" xmlns:p="http://schemas.openxmlformats.org/presentationml/2006/main" xmlns:c="http://schemas.openxmlformats.org/drawingml/2006/chart" xmlns:dgm="http://schemas.openxmlformats.org/drawingml/2006/diagram" xmlns:o="urn:schemas-microsoft-com:office:office" xmlns:v="urn:schemas-microsoft-com:vml" xmlns:pvml="urn:schemas-microsoft-com:office:powerpoint" xmlns:com="http://schemas.openxmlformats.org/drawingml/2006/compatibility" xmlns:p14="http://schemas.microsoft.com/office/powerpoint/2010/main" xmlns:p15="http://schemas.microsoft.com/office/powerpoint/2012/main" xmlns:ahyp="http://schemas.microsoft.com/office/drawing/2018/hyperlinkcolor" showMasterPhAnim="0" showMasterSp="0">
+  <p:cSld>
+    <p:spTree>
+      <p:nvGrpSpPr>
+        <p:cNvPr id="146" name="Shape 146"/>
+        <p:cNvGrpSpPr/>
+        <p:nvPr/>
+      </p:nvGrpSpPr>
+      <p:grpSpPr>
+        <a:xfrm>
+          <a:off x="0" y="0"/>
+          <a:ext cx="0" cy="0"/>
+          <a:chOff x="0" y="0"/>
+          <a:chExt cx="0" cy="0"/>
+        </a:xfrm>
+      </p:grpSpPr>
+      <p:sp>
+        <p:nvSpPr>
+          <p:cNvPr id="147" name="Google Shape;147;g1e94a98702f_0_0:notes"/>
+          <p:cNvSpPr/>
+          <p:nvPr>
+            <p:ph idx="2" type="sldImg"/>
+          </p:nvPr>
+        </p:nvSpPr>
+        <p:spPr>
+          <a:xfrm>
+            <a:off x="381300" y="685800"/>
+            <a:ext cx="6096000" cy="3429000"/>
+          </a:xfrm>
+          <a:custGeom>
+            <a:rect b="b" l="l" r="r" t="t"/>
+            <a:pathLst>
+              <a:path extrusionOk="0" h="120000" w="120000">
+                <a:moveTo>
+                  <a:pt x="0" y="0"/>
+                </a:moveTo>
+                <a:lnTo>
+                  <a:pt x="120000" y="0"/>
+                </a:lnTo>
+                <a:lnTo>
+                  <a:pt x="120000" y="120000"/>
+                </a:lnTo>
+                <a:lnTo>
+                  <a:pt x="0" y="120000"/>
+                </a:lnTo>
+                <a:close/>
+              </a:path>
+            </a:pathLst>
+          </a:custGeom>
+        </p:spPr>
+      </p:sp>
+      <p:sp>
+        <p:nvSpPr>
+          <p:cNvPr id="148" name="Google Shape;148;g1e94a98702f_0_0:notes"/>
+          <p:cNvSpPr txBox="1"/>
+          <p:nvPr>
+            <p:ph idx="1" type="body"/>
+          </p:nvPr>
+        </p:nvSpPr>
+        <p:spPr>
+          <a:xfrm>
+            <a:off x="685800" y="4343400"/>
+            <a:ext cx="5486400" cy="4114800"/>
+          </a:xfrm>
+          <a:prstGeom prst="rect">
+            <a:avLst/>
+          </a:prstGeom>
+        </p:spPr>
+        <p:txBody>
+          <a:bodyPr anchorCtr="0" anchor="t" bIns="91425" lIns="91425" spcFirstLastPara="1" rIns="91425" wrap="square" tIns="91425">
+            <a:noAutofit/>
+          </a:bodyPr>
+          <a:lstStyle/>
+          <a:p>
+            <a:pPr indent="0" lvl="0" marL="0" rtl="0" algn="l">
+              <a:spcBef>
+                <a:spcPts val="0"/>
+              </a:spcBef>
+              <a:spcAft>
+                <a:spcPts val="0"/>
+              </a:spcAft>
+              <a:buNone/>
+            </a:pPr>
+            <a:r>
+              <a:t/>
+            </a:r>
+            <a:endParaRPr/>
+          </a:p>
+        </p:txBody>
+      </p:sp>
+    </p:spTree>
+  </p:cSld>
+  <p:clrMapOvr>
+    <a:masterClrMapping/>
+  </p:clrMapOvr>
+</p:notes>
+</file>
+
+<file path=ppt/notesSlides/notesSlide15.xml><?xml version="1.0" encoding="utf-8"?>
+<p:notes xmlns:a="http://schemas.openxmlformats.org/drawingml/2006/main" xmlns:r="http://schemas.openxmlformats.org/officeDocument/2006/relationships" xmlns:mc="http://schemas.openxmlformats.org/markup-compatibility/2006" xmlns:mv="urn:schemas-microsoft-com:mac:vml" xmlns:p="http://schemas.openxmlformats.org/presentationml/2006/main" xmlns:c="http://schemas.openxmlformats.org/drawingml/2006/chart" xmlns:dgm="http://schemas.openxmlformats.org/drawingml/2006/diagram" xmlns:o="urn:schemas-microsoft-com:office:office" xmlns:v="urn:schemas-microsoft-com:vml" xmlns:pvml="urn:schemas-microsoft-com:office:powerpoint" xmlns:com="http://schemas.openxmlformats.org/drawingml/2006/compatibility" xmlns:p14="http://schemas.microsoft.com/office/powerpoint/2010/main" xmlns:p15="http://schemas.microsoft.com/office/powerpoint/2012/main" xmlns:ahyp="http://schemas.microsoft.com/office/drawing/2018/hyperlinkcolor" showMasterPhAnim="0" showMasterSp="0">
+  <p:cSld>
+    <p:spTree>
+      <p:nvGrpSpPr>
+        <p:cNvPr id="153" name="Shape 153"/>
+        <p:cNvGrpSpPr/>
+        <p:nvPr/>
+      </p:nvGrpSpPr>
+      <p:grpSpPr>
+        <a:xfrm>
+          <a:off x="0" y="0"/>
+          <a:ext cx="0" cy="0"/>
+          <a:chOff x="0" y="0"/>
+          <a:chExt cx="0" cy="0"/>
+        </a:xfrm>
+      </p:grpSpPr>
+      <p:sp>
+        <p:nvSpPr>
+          <p:cNvPr id="154" name="Google Shape;154;g1e94d985ab4_0_90:notes"/>
+          <p:cNvSpPr/>
+          <p:nvPr>
+            <p:ph idx="2" type="sldImg"/>
+          </p:nvPr>
+        </p:nvSpPr>
+        <p:spPr>
+          <a:xfrm>
+            <a:off x="381300" y="685800"/>
+            <a:ext cx="6096000" cy="3429000"/>
+          </a:xfrm>
+          <a:custGeom>
+            <a:rect b="b" l="l" r="r" t="t"/>
+            <a:pathLst>
+              <a:path extrusionOk="0" h="120000" w="120000">
+                <a:moveTo>
+                  <a:pt x="0" y="0"/>
+                </a:moveTo>
+                <a:lnTo>
+                  <a:pt x="120000" y="0"/>
+                </a:lnTo>
+                <a:lnTo>
+                  <a:pt x="120000" y="120000"/>
+                </a:lnTo>
+                <a:lnTo>
+                  <a:pt x="0" y="120000"/>
+                </a:lnTo>
+                <a:close/>
+              </a:path>
+            </a:pathLst>
+          </a:custGeom>
+        </p:spPr>
+      </p:sp>
+      <p:sp>
+        <p:nvSpPr>
+          <p:cNvPr id="155" name="Google Shape;155;g1e94d985ab4_0_90:notes"/>
+          <p:cNvSpPr txBox="1"/>
+          <p:nvPr>
+            <p:ph idx="1" type="body"/>
+          </p:nvPr>
+        </p:nvSpPr>
+        <p:spPr>
+          <a:xfrm>
+            <a:off x="685800" y="4343400"/>
+            <a:ext cx="5486400" cy="4114800"/>
+          </a:xfrm>
+          <a:prstGeom prst="rect">
+            <a:avLst/>
+          </a:prstGeom>
+        </p:spPr>
+        <p:txBody>
+          <a:bodyPr anchorCtr="0" anchor="t" bIns="91425" lIns="91425" spcFirstLastPara="1" rIns="91425" wrap="square" tIns="91425">
+            <a:noAutofit/>
+          </a:bodyPr>
+          <a:lstStyle/>
+          <a:p>
+            <a:pPr indent="0" lvl="0" marL="0" rtl="0" algn="l">
+              <a:spcBef>
+                <a:spcPts val="0"/>
+              </a:spcBef>
+              <a:spcAft>
+                <a:spcPts val="0"/>
+              </a:spcAft>
+              <a:buNone/>
+            </a:pPr>
+            <a:r>
+              <a:t/>
+            </a:r>
+            <a:endParaRPr/>
+          </a:p>
+        </p:txBody>
+      </p:sp>
+    </p:spTree>
+  </p:cSld>
+  <p:clrMapOvr>
+    <a:masterClrMapping/>
+  </p:clrMapOvr>
+</p:notes>
+</file>
+
+<file path=ppt/notesSlides/notesSlide16.xml><?xml version="1.0" encoding="utf-8"?>
+<p:notes xmlns:a="http://schemas.openxmlformats.org/drawingml/2006/main" xmlns:r="http://schemas.openxmlformats.org/officeDocument/2006/relationships" xmlns:mc="http://schemas.openxmlformats.org/markup-compatibility/2006" xmlns:mv="urn:schemas-microsoft-com:mac:vml" xmlns:p="http://schemas.openxmlformats.org/presentationml/2006/main" xmlns:c="http://schemas.openxmlformats.org/drawingml/2006/chart" xmlns:dgm="http://schemas.openxmlformats.org/drawingml/2006/diagram" xmlns:o="urn:schemas-microsoft-com:office:office" xmlns:v="urn:schemas-microsoft-com:vml" xmlns:pvml="urn:schemas-microsoft-com:office:powerpoint" xmlns:com="http://schemas.openxmlformats.org/drawingml/2006/compatibility" xmlns:p14="http://schemas.microsoft.com/office/powerpoint/2010/main" xmlns:p15="http://schemas.microsoft.com/office/powerpoint/2012/main" xmlns:ahyp="http://schemas.microsoft.com/office/drawing/2018/hyperlinkcolor" showMasterPhAnim="0" showMasterSp="0">
+  <p:cSld>
+    <p:spTree>
+      <p:nvGrpSpPr>
+        <p:cNvPr id="159" name="Shape 159"/>
+        <p:cNvGrpSpPr/>
+        <p:nvPr/>
+      </p:nvGrpSpPr>
+      <p:grpSpPr>
+        <a:xfrm>
+          <a:off x="0" y="0"/>
+          <a:ext cx="0" cy="0"/>
+          <a:chOff x="0" y="0"/>
+          <a:chExt cx="0" cy="0"/>
+        </a:xfrm>
+      </p:grpSpPr>
+      <p:sp>
+        <p:nvSpPr>
+          <p:cNvPr id="160" name="Google Shape;160;g1e94a98702f_0_16:notes"/>
+          <p:cNvSpPr/>
+          <p:nvPr>
+            <p:ph idx="2" type="sldImg"/>
+          </p:nvPr>
+        </p:nvSpPr>
+        <p:spPr>
+          <a:xfrm>
+            <a:off x="381300" y="685800"/>
+            <a:ext cx="6096000" cy="3429000"/>
+          </a:xfrm>
+          <a:custGeom>
+            <a:rect b="b" l="l" r="r" t="t"/>
+            <a:pathLst>
+              <a:path extrusionOk="0" h="120000" w="120000">
+                <a:moveTo>
+                  <a:pt x="0" y="0"/>
+                </a:moveTo>
+                <a:lnTo>
+                  <a:pt x="120000" y="0"/>
+                </a:lnTo>
+                <a:lnTo>
+                  <a:pt x="120000" y="120000"/>
+                </a:lnTo>
+                <a:lnTo>
+                  <a:pt x="0" y="120000"/>
+                </a:lnTo>
+                <a:close/>
+              </a:path>
+            </a:pathLst>
+          </a:custGeom>
+        </p:spPr>
+      </p:sp>
+      <p:sp>
+        <p:nvSpPr>
+          <p:cNvPr id="161" name="Google Shape;161;g1e94a98702f_0_16:notes"/>
+          <p:cNvSpPr txBox="1"/>
+          <p:nvPr>
+            <p:ph idx="1" type="body"/>
+          </p:nvPr>
+        </p:nvSpPr>
+        <p:spPr>
+          <a:xfrm>
+            <a:off x="685800" y="4343400"/>
+            <a:ext cx="5486400" cy="4114800"/>
+          </a:xfrm>
+          <a:prstGeom prst="rect">
+            <a:avLst/>
+          </a:prstGeom>
+        </p:spPr>
+        <p:txBody>
+          <a:bodyPr anchorCtr="0" anchor="t" bIns="91425" lIns="91425" spcFirstLastPara="1" rIns="91425" wrap="square" tIns="91425">
+            <a:noAutofit/>
+          </a:bodyPr>
+          <a:lstStyle/>
+          <a:p>
+            <a:pPr indent="0" lvl="0" marL="0" rtl="0" algn="l">
+              <a:spcBef>
+                <a:spcPts val="0"/>
+              </a:spcBef>
+              <a:spcAft>
+                <a:spcPts val="0"/>
+              </a:spcAft>
+              <a:buNone/>
+            </a:pPr>
+            <a:r>
+              <a:t/>
+            </a:r>
+            <a:endParaRPr/>
+          </a:p>
+        </p:txBody>
+      </p:sp>
+    </p:spTree>
+  </p:cSld>
+  <p:clrMapOvr>
+    <a:masterClrMapping/>
+  </p:clrMapOvr>
+</p:notes>
+</file>
+
+<file path=ppt/notesSlides/notesSlide17.xml><?xml version="1.0" encoding="utf-8"?>
+<p:notes xmlns:a="http://schemas.openxmlformats.org/drawingml/2006/main" xmlns:r="http://schemas.openxmlformats.org/officeDocument/2006/relationships" xmlns:mc="http://schemas.openxmlformats.org/markup-compatibility/2006" xmlns:mv="urn:schemas-microsoft-com:mac:vml" xmlns:p="http://schemas.openxmlformats.org/presentationml/2006/main" xmlns:c="http://schemas.openxmlformats.org/drawingml/2006/chart" xmlns:dgm="http://schemas.openxmlformats.org/drawingml/2006/diagram" xmlns:o="urn:schemas-microsoft-com:office:office" xmlns:v="urn:schemas-microsoft-com:vml" xmlns:pvml="urn:schemas-microsoft-com:office:powerpoint" xmlns:com="http://schemas.openxmlformats.org/drawingml/2006/compatibility" xmlns:p14="http://schemas.microsoft.com/office/powerpoint/2010/main" xmlns:p15="http://schemas.microsoft.com/office/powerpoint/2012/main" xmlns:ahyp="http://schemas.microsoft.com/office/drawing/2018/hyperlinkcolor" showMasterPhAnim="0" showMasterSp="0">
+  <p:cSld>
+    <p:spTree>
+      <p:nvGrpSpPr>
+        <p:cNvPr id="164" name="Shape 164"/>
+        <p:cNvGrpSpPr/>
+        <p:nvPr/>
+      </p:nvGrpSpPr>
+      <p:grpSpPr>
+        <a:xfrm>
+          <a:off x="0" y="0"/>
+          <a:ext cx="0" cy="0"/>
+          <a:chOff x="0" y="0"/>
+          <a:chExt cx="0" cy="0"/>
+        </a:xfrm>
+      </p:grpSpPr>
+      <p:sp>
+        <p:nvSpPr>
+          <p:cNvPr id="165" name="Google Shape;165;g1e94d985ab4_0_0:notes"/>
+          <p:cNvSpPr/>
+          <p:nvPr>
+            <p:ph idx="2" type="sldImg"/>
+          </p:nvPr>
+        </p:nvSpPr>
+        <p:spPr>
+          <a:xfrm>
+            <a:off x="381300" y="685800"/>
+            <a:ext cx="6096000" cy="3429000"/>
+          </a:xfrm>
+          <a:custGeom>
+            <a:rect b="b" l="l" r="r" t="t"/>
+            <a:pathLst>
+              <a:path extrusionOk="0" h="120000" w="120000">
+                <a:moveTo>
+                  <a:pt x="0" y="0"/>
+                </a:moveTo>
+                <a:lnTo>
+                  <a:pt x="120000" y="0"/>
+                </a:lnTo>
+                <a:lnTo>
+                  <a:pt x="120000" y="120000"/>
+                </a:lnTo>
+                <a:lnTo>
+                  <a:pt x="0" y="120000"/>
+                </a:lnTo>
+                <a:close/>
+              </a:path>
+            </a:pathLst>
+          </a:custGeom>
+        </p:spPr>
+      </p:sp>
+      <p:sp>
+        <p:nvSpPr>
+          <p:cNvPr id="166" name="Google Shape;166;g1e94d985ab4_0_0:notes"/>
+          <p:cNvSpPr txBox="1"/>
+          <p:nvPr>
+            <p:ph idx="1" type="body"/>
+          </p:nvPr>
+        </p:nvSpPr>
+        <p:spPr>
+          <a:xfrm>
+            <a:off x="685800" y="4343400"/>
+            <a:ext cx="5486400" cy="4114800"/>
+          </a:xfrm>
+          <a:prstGeom prst="rect">
+            <a:avLst/>
+          </a:prstGeom>
+        </p:spPr>
+        <p:txBody>
+          <a:bodyPr anchorCtr="0" anchor="t" bIns="91425" lIns="91425" spcFirstLastPara="1" rIns="91425" wrap="square" tIns="91425">
+            <a:noAutofit/>
+          </a:bodyPr>
+          <a:lstStyle/>
+          <a:p>
+            <a:pPr indent="0" lvl="0" marL="0" rtl="0" algn="l">
+              <a:spcBef>
+                <a:spcPts val="0"/>
+              </a:spcBef>
+              <a:spcAft>
+                <a:spcPts val="0"/>
+              </a:spcAft>
+              <a:buNone/>
+            </a:pPr>
+            <a:r>
+              <a:t/>
+            </a:r>
+            <a:endParaRPr/>
+          </a:p>
+        </p:txBody>
+      </p:sp>
+    </p:spTree>
+  </p:cSld>
+  <p:clrMapOvr>
+    <a:masterClrMapping/>
+  </p:clrMapOvr>
+</p:notes>
+</file>
+
+<file path=ppt/notesSlides/notesSlide18.xml><?xml version="1.0" encoding="utf-8"?>
+<p:notes xmlns:a="http://schemas.openxmlformats.org/drawingml/2006/main" xmlns:r="http://schemas.openxmlformats.org/officeDocument/2006/relationships" xmlns:mc="http://schemas.openxmlformats.org/markup-compatibility/2006" xmlns:mv="urn:schemas-microsoft-com:mac:vml" xmlns:p="http://schemas.openxmlformats.org/presentationml/2006/main" xmlns:c="http://schemas.openxmlformats.org/drawingml/2006/chart" xmlns:dgm="http://schemas.openxmlformats.org/drawingml/2006/diagram" xmlns:o="urn:schemas-microsoft-com:office:office" xmlns:v="urn:schemas-microsoft-com:vml" xmlns:pvml="urn:schemas-microsoft-com:office:powerpoint" xmlns:com="http://schemas.openxmlformats.org/drawingml/2006/compatibility" xmlns:p14="http://schemas.microsoft.com/office/powerpoint/2010/main" xmlns:p15="http://schemas.microsoft.com/office/powerpoint/2012/main" xmlns:ahyp="http://schemas.microsoft.com/office/drawing/2018/hyperlinkcolor" showMasterPhAnim="0" showMasterSp="0">
+  <p:cSld>
+    <p:spTree>
+      <p:nvGrpSpPr>
+        <p:cNvPr id="173" name="Shape 173"/>
+        <p:cNvGrpSpPr/>
+        <p:nvPr/>
+      </p:nvGrpSpPr>
+      <p:grpSpPr>
+        <a:xfrm>
+          <a:off x="0" y="0"/>
+          <a:ext cx="0" cy="0"/>
+          <a:chOff x="0" y="0"/>
+          <a:chExt cx="0" cy="0"/>
+        </a:xfrm>
+      </p:grpSpPr>
+      <p:sp>
+        <p:nvSpPr>
+          <p:cNvPr id="174" name="Google Shape;174;g1e94d985ab4_0_17:notes"/>
+          <p:cNvSpPr/>
+          <p:nvPr>
+            <p:ph idx="2" type="sldImg"/>
+          </p:nvPr>
+        </p:nvSpPr>
+        <p:spPr>
+          <a:xfrm>
+            <a:off x="381300" y="685800"/>
+            <a:ext cx="6096000" cy="3429000"/>
+          </a:xfrm>
+          <a:custGeom>
+            <a:rect b="b" l="l" r="r" t="t"/>
+            <a:pathLst>
+              <a:path extrusionOk="0" h="120000" w="120000">
+                <a:moveTo>
+                  <a:pt x="0" y="0"/>
+                </a:moveTo>
+                <a:lnTo>
+                  <a:pt x="120000" y="0"/>
+                </a:lnTo>
+                <a:lnTo>
+                  <a:pt x="120000" y="120000"/>
+                </a:lnTo>
+                <a:lnTo>
+                  <a:pt x="0" y="120000"/>
+                </a:lnTo>
+                <a:close/>
+              </a:path>
+            </a:pathLst>
+          </a:custGeom>
+        </p:spPr>
+      </p:sp>
+      <p:sp>
+        <p:nvSpPr>
+          <p:cNvPr id="175" name="Google Shape;175;g1e94d985ab4_0_17:notes"/>
+          <p:cNvSpPr txBox="1"/>
+          <p:nvPr>
+            <p:ph idx="1" type="body"/>
+          </p:nvPr>
+        </p:nvSpPr>
+        <p:spPr>
+          <a:xfrm>
+            <a:off x="685800" y="4343400"/>
+            <a:ext cx="5486400" cy="4114800"/>
+          </a:xfrm>
+          <a:prstGeom prst="rect">
+            <a:avLst/>
+          </a:prstGeom>
+        </p:spPr>
+        <p:txBody>
+          <a:bodyPr anchorCtr="0" anchor="t" bIns="91425" lIns="91425" spcFirstLastPara="1" rIns="91425" wrap="square" tIns="91425">
+            <a:noAutofit/>
+          </a:bodyPr>
+          <a:lstStyle/>
+          <a:p>
+            <a:pPr indent="0" lvl="0" marL="0" rtl="0" algn="l">
+              <a:spcBef>
+                <a:spcPts val="0"/>
+              </a:spcBef>
+              <a:spcAft>
+                <a:spcPts val="0"/>
+              </a:spcAft>
+              <a:buNone/>
+            </a:pPr>
+            <a:r>
+              <a:t/>
+            </a:r>
+            <a:endParaRPr/>
+          </a:p>
+        </p:txBody>
+      </p:sp>
+    </p:spTree>
+  </p:cSld>
+  <p:clrMapOvr>
+    <a:masterClrMapping/>
+  </p:clrMapOvr>
+</p:notes>
+</file>
+
+<file path=ppt/notesSlides/notesSlide19.xml><?xml version="1.0" encoding="utf-8"?>
+<p:notes xmlns:a="http://schemas.openxmlformats.org/drawingml/2006/main" xmlns:r="http://schemas.openxmlformats.org/officeDocument/2006/relationships" xmlns:mc="http://schemas.openxmlformats.org/markup-compatibility/2006" xmlns:mv="urn:schemas-microsoft-com:mac:vml" xmlns:p="http://schemas.openxmlformats.org/presentationml/2006/main" xmlns:c="http://schemas.openxmlformats.org/drawingml/2006/chart" xmlns:dgm="http://schemas.openxmlformats.org/drawingml/2006/diagram" xmlns:o="urn:schemas-microsoft-com:office:office" xmlns:v="urn:schemas-microsoft-com:vml" xmlns:pvml="urn:schemas-microsoft-com:office:powerpoint" xmlns:com="http://schemas.openxmlformats.org/drawingml/2006/compatibility" xmlns:p14="http://schemas.microsoft.com/office/powerpoint/2010/main" xmlns:p15="http://schemas.microsoft.com/office/powerpoint/2012/main" xmlns:ahyp="http://schemas.microsoft.com/office/drawing/2018/hyperlinkcolor" showMasterPhAnim="0" showMasterSp="0">
+  <p:cSld>
+    <p:spTree>
+      <p:nvGrpSpPr>
+        <p:cNvPr id="182" name="Shape 182"/>
+        <p:cNvGrpSpPr/>
+        <p:nvPr/>
+      </p:nvGrpSpPr>
+      <p:grpSpPr>
+        <a:xfrm>
+          <a:off x="0" y="0"/>
+          <a:ext cx="0" cy="0"/>
+          <a:chOff x="0" y="0"/>
+          <a:chExt cx="0" cy="0"/>
+        </a:xfrm>
+      </p:grpSpPr>
+      <p:sp>
+        <p:nvSpPr>
+          <p:cNvPr id="183" name="Google Shape;183;g1e94d985ab4_0_29:notes"/>
+          <p:cNvSpPr/>
+          <p:nvPr>
+            <p:ph idx="2" type="sldImg"/>
+          </p:nvPr>
+        </p:nvSpPr>
+        <p:spPr>
+          <a:xfrm>
+            <a:off x="381300" y="685800"/>
+            <a:ext cx="6096000" cy="3429000"/>
+          </a:xfrm>
+          <a:custGeom>
+            <a:rect b="b" l="l" r="r" t="t"/>
+            <a:pathLst>
+              <a:path extrusionOk="0" h="120000" w="120000">
+                <a:moveTo>
+                  <a:pt x="0" y="0"/>
+                </a:moveTo>
+                <a:lnTo>
+                  <a:pt x="120000" y="0"/>
+                </a:lnTo>
+                <a:lnTo>
+                  <a:pt x="120000" y="120000"/>
+                </a:lnTo>
+                <a:lnTo>
+                  <a:pt x="0" y="120000"/>
+                </a:lnTo>
+                <a:close/>
+              </a:path>
+            </a:pathLst>
+          </a:custGeom>
+        </p:spPr>
+      </p:sp>
+      <p:sp>
+        <p:nvSpPr>
+          <p:cNvPr id="184" name="Google Shape;184;g1e94d985ab4_0_29:notes"/>
           <p:cNvSpPr txBox="1"/>
           <p:nvPr>
             <p:ph idx="1" type="body"/>
@@ -1227,7 +1825,7 @@
       </p:grpSpPr>
       <p:sp>
         <p:nvSpPr>
-          <p:cNvPr id="63" name="Google Shape;63;g2778e5b14e3_0_50:notes"/>
+          <p:cNvPr id="63" name="Google Shape;63;g2778e5b14e3_0_55:notes"/>
           <p:cNvSpPr/>
           <p:nvPr>
             <p:ph idx="2" type="sldImg"/>
@@ -1262,7 +1860,403 @@
       </p:sp>
       <p:sp>
         <p:nvSpPr>
-          <p:cNvPr id="64" name="Google Shape;64;g2778e5b14e3_0_50:notes"/>
+          <p:cNvPr id="64" name="Google Shape;64;g2778e5b14e3_0_55:notes"/>
+          <p:cNvSpPr txBox="1"/>
+          <p:nvPr>
+            <p:ph idx="1" type="body"/>
+          </p:nvPr>
+        </p:nvSpPr>
+        <p:spPr>
+          <a:xfrm>
+            <a:off x="685800" y="4343400"/>
+            <a:ext cx="5486400" cy="4114800"/>
+          </a:xfrm>
+          <a:prstGeom prst="rect">
+            <a:avLst/>
+          </a:prstGeom>
+        </p:spPr>
+        <p:txBody>
+          <a:bodyPr anchorCtr="0" anchor="t" bIns="91425" lIns="91425" spcFirstLastPara="1" rIns="91425" wrap="square" tIns="91425">
+            <a:noAutofit/>
+          </a:bodyPr>
+          <a:lstStyle/>
+          <a:p>
+            <a:pPr indent="0" lvl="0" marL="0" rtl="0" algn="l">
+              <a:spcBef>
+                <a:spcPts val="0"/>
+              </a:spcBef>
+              <a:spcAft>
+                <a:spcPts val="0"/>
+              </a:spcAft>
+              <a:buNone/>
+            </a:pPr>
+            <a:r>
+              <a:t/>
+            </a:r>
+            <a:endParaRPr/>
+          </a:p>
+        </p:txBody>
+      </p:sp>
+    </p:spTree>
+  </p:cSld>
+  <p:clrMapOvr>
+    <a:masterClrMapping/>
+  </p:clrMapOvr>
+</p:notes>
+</file>
+
+<file path=ppt/notesSlides/notesSlide20.xml><?xml version="1.0" encoding="utf-8"?>
+<p:notes xmlns:a="http://schemas.openxmlformats.org/drawingml/2006/main" xmlns:r="http://schemas.openxmlformats.org/officeDocument/2006/relationships" xmlns:mc="http://schemas.openxmlformats.org/markup-compatibility/2006" xmlns:mv="urn:schemas-microsoft-com:mac:vml" xmlns:p="http://schemas.openxmlformats.org/presentationml/2006/main" xmlns:c="http://schemas.openxmlformats.org/drawingml/2006/chart" xmlns:dgm="http://schemas.openxmlformats.org/drawingml/2006/diagram" xmlns:o="urn:schemas-microsoft-com:office:office" xmlns:v="urn:schemas-microsoft-com:vml" xmlns:pvml="urn:schemas-microsoft-com:office:powerpoint" xmlns:com="http://schemas.openxmlformats.org/drawingml/2006/compatibility" xmlns:p14="http://schemas.microsoft.com/office/powerpoint/2010/main" xmlns:p15="http://schemas.microsoft.com/office/powerpoint/2012/main" xmlns:ahyp="http://schemas.microsoft.com/office/drawing/2018/hyperlinkcolor" showMasterPhAnim="0" showMasterSp="0">
+  <p:cSld>
+    <p:spTree>
+      <p:nvGrpSpPr>
+        <p:cNvPr id="191" name="Shape 191"/>
+        <p:cNvGrpSpPr/>
+        <p:nvPr/>
+      </p:nvGrpSpPr>
+      <p:grpSpPr>
+        <a:xfrm>
+          <a:off x="0" y="0"/>
+          <a:ext cx="0" cy="0"/>
+          <a:chOff x="0" y="0"/>
+          <a:chExt cx="0" cy="0"/>
+        </a:xfrm>
+      </p:grpSpPr>
+      <p:sp>
+        <p:nvSpPr>
+          <p:cNvPr id="192" name="Google Shape;192;g1e94d985ab4_0_40:notes"/>
+          <p:cNvSpPr/>
+          <p:nvPr>
+            <p:ph idx="2" type="sldImg"/>
+          </p:nvPr>
+        </p:nvSpPr>
+        <p:spPr>
+          <a:xfrm>
+            <a:off x="381300" y="685800"/>
+            <a:ext cx="6096000" cy="3429000"/>
+          </a:xfrm>
+          <a:custGeom>
+            <a:rect b="b" l="l" r="r" t="t"/>
+            <a:pathLst>
+              <a:path extrusionOk="0" h="120000" w="120000">
+                <a:moveTo>
+                  <a:pt x="0" y="0"/>
+                </a:moveTo>
+                <a:lnTo>
+                  <a:pt x="120000" y="0"/>
+                </a:lnTo>
+                <a:lnTo>
+                  <a:pt x="120000" y="120000"/>
+                </a:lnTo>
+                <a:lnTo>
+                  <a:pt x="0" y="120000"/>
+                </a:lnTo>
+                <a:close/>
+              </a:path>
+            </a:pathLst>
+          </a:custGeom>
+        </p:spPr>
+      </p:sp>
+      <p:sp>
+        <p:nvSpPr>
+          <p:cNvPr id="193" name="Google Shape;193;g1e94d985ab4_0_40:notes"/>
+          <p:cNvSpPr txBox="1"/>
+          <p:nvPr>
+            <p:ph idx="1" type="body"/>
+          </p:nvPr>
+        </p:nvSpPr>
+        <p:spPr>
+          <a:xfrm>
+            <a:off x="685800" y="4343400"/>
+            <a:ext cx="5486400" cy="4114800"/>
+          </a:xfrm>
+          <a:prstGeom prst="rect">
+            <a:avLst/>
+          </a:prstGeom>
+        </p:spPr>
+        <p:txBody>
+          <a:bodyPr anchorCtr="0" anchor="t" bIns="91425" lIns="91425" spcFirstLastPara="1" rIns="91425" wrap="square" tIns="91425">
+            <a:noAutofit/>
+          </a:bodyPr>
+          <a:lstStyle/>
+          <a:p>
+            <a:pPr indent="0" lvl="0" marL="0" rtl="0" algn="l">
+              <a:spcBef>
+                <a:spcPts val="0"/>
+              </a:spcBef>
+              <a:spcAft>
+                <a:spcPts val="0"/>
+              </a:spcAft>
+              <a:buNone/>
+            </a:pPr>
+            <a:r>
+              <a:t/>
+            </a:r>
+            <a:endParaRPr/>
+          </a:p>
+        </p:txBody>
+      </p:sp>
+    </p:spTree>
+  </p:cSld>
+  <p:clrMapOvr>
+    <a:masterClrMapping/>
+  </p:clrMapOvr>
+</p:notes>
+</file>
+
+<file path=ppt/notesSlides/notesSlide21.xml><?xml version="1.0" encoding="utf-8"?>
+<p:notes xmlns:a="http://schemas.openxmlformats.org/drawingml/2006/main" xmlns:r="http://schemas.openxmlformats.org/officeDocument/2006/relationships" xmlns:mc="http://schemas.openxmlformats.org/markup-compatibility/2006" xmlns:mv="urn:schemas-microsoft-com:mac:vml" xmlns:p="http://schemas.openxmlformats.org/presentationml/2006/main" xmlns:c="http://schemas.openxmlformats.org/drawingml/2006/chart" xmlns:dgm="http://schemas.openxmlformats.org/drawingml/2006/diagram" xmlns:o="urn:schemas-microsoft-com:office:office" xmlns:v="urn:schemas-microsoft-com:vml" xmlns:pvml="urn:schemas-microsoft-com:office:powerpoint" xmlns:com="http://schemas.openxmlformats.org/drawingml/2006/compatibility" xmlns:p14="http://schemas.microsoft.com/office/powerpoint/2010/main" xmlns:p15="http://schemas.microsoft.com/office/powerpoint/2012/main" xmlns:ahyp="http://schemas.microsoft.com/office/drawing/2018/hyperlinkcolor" showMasterPhAnim="0" showMasterSp="0">
+  <p:cSld>
+    <p:spTree>
+      <p:nvGrpSpPr>
+        <p:cNvPr id="200" name="Shape 200"/>
+        <p:cNvGrpSpPr/>
+        <p:nvPr/>
+      </p:nvGrpSpPr>
+      <p:grpSpPr>
+        <a:xfrm>
+          <a:off x="0" y="0"/>
+          <a:ext cx="0" cy="0"/>
+          <a:chOff x="0" y="0"/>
+          <a:chExt cx="0" cy="0"/>
+        </a:xfrm>
+      </p:grpSpPr>
+      <p:sp>
+        <p:nvSpPr>
+          <p:cNvPr id="201" name="Google Shape;201;g1e94d985ab4_0_51:notes"/>
+          <p:cNvSpPr/>
+          <p:nvPr>
+            <p:ph idx="2" type="sldImg"/>
+          </p:nvPr>
+        </p:nvSpPr>
+        <p:spPr>
+          <a:xfrm>
+            <a:off x="381300" y="685800"/>
+            <a:ext cx="6096000" cy="3429000"/>
+          </a:xfrm>
+          <a:custGeom>
+            <a:rect b="b" l="l" r="r" t="t"/>
+            <a:pathLst>
+              <a:path extrusionOk="0" h="120000" w="120000">
+                <a:moveTo>
+                  <a:pt x="0" y="0"/>
+                </a:moveTo>
+                <a:lnTo>
+                  <a:pt x="120000" y="0"/>
+                </a:lnTo>
+                <a:lnTo>
+                  <a:pt x="120000" y="120000"/>
+                </a:lnTo>
+                <a:lnTo>
+                  <a:pt x="0" y="120000"/>
+                </a:lnTo>
+                <a:close/>
+              </a:path>
+            </a:pathLst>
+          </a:custGeom>
+        </p:spPr>
+      </p:sp>
+      <p:sp>
+        <p:nvSpPr>
+          <p:cNvPr id="202" name="Google Shape;202;g1e94d985ab4_0_51:notes"/>
+          <p:cNvSpPr txBox="1"/>
+          <p:nvPr>
+            <p:ph idx="1" type="body"/>
+          </p:nvPr>
+        </p:nvSpPr>
+        <p:spPr>
+          <a:xfrm>
+            <a:off x="685800" y="4343400"/>
+            <a:ext cx="5486400" cy="4114800"/>
+          </a:xfrm>
+          <a:prstGeom prst="rect">
+            <a:avLst/>
+          </a:prstGeom>
+        </p:spPr>
+        <p:txBody>
+          <a:bodyPr anchorCtr="0" anchor="t" bIns="91425" lIns="91425" spcFirstLastPara="1" rIns="91425" wrap="square" tIns="91425">
+            <a:noAutofit/>
+          </a:bodyPr>
+          <a:lstStyle/>
+          <a:p>
+            <a:pPr indent="0" lvl="0" marL="0" rtl="0" algn="l">
+              <a:spcBef>
+                <a:spcPts val="0"/>
+              </a:spcBef>
+              <a:spcAft>
+                <a:spcPts val="0"/>
+              </a:spcAft>
+              <a:buNone/>
+            </a:pPr>
+            <a:r>
+              <a:t/>
+            </a:r>
+            <a:endParaRPr/>
+          </a:p>
+        </p:txBody>
+      </p:sp>
+    </p:spTree>
+  </p:cSld>
+  <p:clrMapOvr>
+    <a:masterClrMapping/>
+  </p:clrMapOvr>
+</p:notes>
+</file>
+
+<file path=ppt/notesSlides/notesSlide22.xml><?xml version="1.0" encoding="utf-8"?>
+<p:notes xmlns:a="http://schemas.openxmlformats.org/drawingml/2006/main" xmlns:r="http://schemas.openxmlformats.org/officeDocument/2006/relationships" xmlns:mc="http://schemas.openxmlformats.org/markup-compatibility/2006" xmlns:mv="urn:schemas-microsoft-com:mac:vml" xmlns:p="http://schemas.openxmlformats.org/presentationml/2006/main" xmlns:c="http://schemas.openxmlformats.org/drawingml/2006/chart" xmlns:dgm="http://schemas.openxmlformats.org/drawingml/2006/diagram" xmlns:o="urn:schemas-microsoft-com:office:office" xmlns:v="urn:schemas-microsoft-com:vml" xmlns:pvml="urn:schemas-microsoft-com:office:powerpoint" xmlns:com="http://schemas.openxmlformats.org/drawingml/2006/compatibility" xmlns:p14="http://schemas.microsoft.com/office/powerpoint/2010/main" xmlns:p15="http://schemas.microsoft.com/office/powerpoint/2012/main" xmlns:ahyp="http://schemas.microsoft.com/office/drawing/2018/hyperlinkcolor" showMasterPhAnim="0" showMasterSp="0">
+  <p:cSld>
+    <p:spTree>
+      <p:nvGrpSpPr>
+        <p:cNvPr id="209" name="Shape 209"/>
+        <p:cNvGrpSpPr/>
+        <p:nvPr/>
+      </p:nvGrpSpPr>
+      <p:grpSpPr>
+        <a:xfrm>
+          <a:off x="0" y="0"/>
+          <a:ext cx="0" cy="0"/>
+          <a:chOff x="0" y="0"/>
+          <a:chExt cx="0" cy="0"/>
+        </a:xfrm>
+      </p:grpSpPr>
+      <p:sp>
+        <p:nvSpPr>
+          <p:cNvPr id="210" name="Google Shape;210;g1e94d985ab4_0_60:notes"/>
+          <p:cNvSpPr/>
+          <p:nvPr>
+            <p:ph idx="2" type="sldImg"/>
+          </p:nvPr>
+        </p:nvSpPr>
+        <p:spPr>
+          <a:xfrm>
+            <a:off x="381300" y="685800"/>
+            <a:ext cx="6096000" cy="3429000"/>
+          </a:xfrm>
+          <a:custGeom>
+            <a:rect b="b" l="l" r="r" t="t"/>
+            <a:pathLst>
+              <a:path extrusionOk="0" h="120000" w="120000">
+                <a:moveTo>
+                  <a:pt x="0" y="0"/>
+                </a:moveTo>
+                <a:lnTo>
+                  <a:pt x="120000" y="0"/>
+                </a:lnTo>
+                <a:lnTo>
+                  <a:pt x="120000" y="120000"/>
+                </a:lnTo>
+                <a:lnTo>
+                  <a:pt x="0" y="120000"/>
+                </a:lnTo>
+                <a:close/>
+              </a:path>
+            </a:pathLst>
+          </a:custGeom>
+        </p:spPr>
+      </p:sp>
+      <p:sp>
+        <p:nvSpPr>
+          <p:cNvPr id="211" name="Google Shape;211;g1e94d985ab4_0_60:notes"/>
+          <p:cNvSpPr txBox="1"/>
+          <p:nvPr>
+            <p:ph idx="1" type="body"/>
+          </p:nvPr>
+        </p:nvSpPr>
+        <p:spPr>
+          <a:xfrm>
+            <a:off x="685800" y="4343400"/>
+            <a:ext cx="5486400" cy="4114800"/>
+          </a:xfrm>
+          <a:prstGeom prst="rect">
+            <a:avLst/>
+          </a:prstGeom>
+        </p:spPr>
+        <p:txBody>
+          <a:bodyPr anchorCtr="0" anchor="t" bIns="91425" lIns="91425" spcFirstLastPara="1" rIns="91425" wrap="square" tIns="91425">
+            <a:noAutofit/>
+          </a:bodyPr>
+          <a:lstStyle/>
+          <a:p>
+            <a:pPr indent="0" lvl="0" marL="0" rtl="0" algn="l">
+              <a:spcBef>
+                <a:spcPts val="0"/>
+              </a:spcBef>
+              <a:spcAft>
+                <a:spcPts val="0"/>
+              </a:spcAft>
+              <a:buNone/>
+            </a:pPr>
+            <a:r>
+              <a:t/>
+            </a:r>
+            <a:endParaRPr/>
+          </a:p>
+        </p:txBody>
+      </p:sp>
+    </p:spTree>
+  </p:cSld>
+  <p:clrMapOvr>
+    <a:masterClrMapping/>
+  </p:clrMapOvr>
+</p:notes>
+</file>
+
+<file path=ppt/notesSlides/notesSlide23.xml><?xml version="1.0" encoding="utf-8"?>
+<p:notes xmlns:a="http://schemas.openxmlformats.org/drawingml/2006/main" xmlns:r="http://schemas.openxmlformats.org/officeDocument/2006/relationships" xmlns:mc="http://schemas.openxmlformats.org/markup-compatibility/2006" xmlns:mv="urn:schemas-microsoft-com:mac:vml" xmlns:p="http://schemas.openxmlformats.org/presentationml/2006/main" xmlns:c="http://schemas.openxmlformats.org/drawingml/2006/chart" xmlns:dgm="http://schemas.openxmlformats.org/drawingml/2006/diagram" xmlns:o="urn:schemas-microsoft-com:office:office" xmlns:v="urn:schemas-microsoft-com:vml" xmlns:pvml="urn:schemas-microsoft-com:office:powerpoint" xmlns:com="http://schemas.openxmlformats.org/drawingml/2006/compatibility" xmlns:p14="http://schemas.microsoft.com/office/powerpoint/2010/main" xmlns:p15="http://schemas.microsoft.com/office/powerpoint/2012/main" xmlns:ahyp="http://schemas.microsoft.com/office/drawing/2018/hyperlinkcolor" showMasterPhAnim="0" showMasterSp="0">
+  <p:cSld>
+    <p:spTree>
+      <p:nvGrpSpPr>
+        <p:cNvPr id="220" name="Shape 220"/>
+        <p:cNvGrpSpPr/>
+        <p:nvPr/>
+      </p:nvGrpSpPr>
+      <p:grpSpPr>
+        <a:xfrm>
+          <a:off x="0" y="0"/>
+          <a:ext cx="0" cy="0"/>
+          <a:chOff x="0" y="0"/>
+          <a:chExt cx="0" cy="0"/>
+        </a:xfrm>
+      </p:grpSpPr>
+      <p:sp>
+        <p:nvSpPr>
+          <p:cNvPr id="221" name="Google Shape;221;g1e94d985ab4_0_84:notes"/>
+          <p:cNvSpPr/>
+          <p:nvPr>
+            <p:ph idx="2" type="sldImg"/>
+          </p:nvPr>
+        </p:nvSpPr>
+        <p:spPr>
+          <a:xfrm>
+            <a:off x="381300" y="685800"/>
+            <a:ext cx="6096000" cy="3429000"/>
+          </a:xfrm>
+          <a:custGeom>
+            <a:rect b="b" l="l" r="r" t="t"/>
+            <a:pathLst>
+              <a:path extrusionOk="0" h="120000" w="120000">
+                <a:moveTo>
+                  <a:pt x="0" y="0"/>
+                </a:moveTo>
+                <a:lnTo>
+                  <a:pt x="120000" y="0"/>
+                </a:lnTo>
+                <a:lnTo>
+                  <a:pt x="120000" y="120000"/>
+                </a:lnTo>
+                <a:lnTo>
+                  <a:pt x="0" y="120000"/>
+                </a:lnTo>
+                <a:close/>
+              </a:path>
+            </a:pathLst>
+          </a:custGeom>
+        </p:spPr>
+      </p:sp>
+      <p:sp>
+        <p:nvSpPr>
+          <p:cNvPr id="222" name="Google Shape;222;g1e94d985ab4_0_84:notes"/>
           <p:cNvSpPr txBox="1"/>
           <p:nvPr>
             <p:ph idx="1" type="body"/>
@@ -1312,7 +2306,7 @@
   <p:cSld>
     <p:spTree>
       <p:nvGrpSpPr>
-        <p:cNvPr id="69" name="Shape 69"/>
+        <p:cNvPr id="68" name="Shape 68"/>
         <p:cNvGrpSpPr/>
         <p:nvPr/>
       </p:nvGrpSpPr>
@@ -1326,7 +2320,7 @@
       </p:grpSpPr>
       <p:sp>
         <p:nvSpPr>
-          <p:cNvPr id="70" name="Google Shape;70;g2778e5b14e3_0_55:notes"/>
+          <p:cNvPr id="69" name="Google Shape;69;g2778e5b14e3_0_60:notes"/>
           <p:cNvSpPr/>
           <p:nvPr>
             <p:ph idx="2" type="sldImg"/>
@@ -1361,7 +2355,7 @@
       </p:sp>
       <p:sp>
         <p:nvSpPr>
-          <p:cNvPr id="71" name="Google Shape;71;g2778e5b14e3_0_55:notes"/>
+          <p:cNvPr id="70" name="Google Shape;70;g2778e5b14e3_0_60:notes"/>
           <p:cNvSpPr txBox="1"/>
           <p:nvPr>
             <p:ph idx="1" type="body"/>
@@ -1411,7 +2405,7 @@
   <p:cSld>
     <p:spTree>
       <p:nvGrpSpPr>
-        <p:cNvPr id="75" name="Shape 75"/>
+        <p:cNvPr id="74" name="Shape 74"/>
         <p:cNvGrpSpPr/>
         <p:nvPr/>
       </p:nvGrpSpPr>
@@ -1425,7 +2419,7 @@
       </p:grpSpPr>
       <p:sp>
         <p:nvSpPr>
-          <p:cNvPr id="76" name="Google Shape;76;g2778e5b14e3_0_60:notes"/>
+          <p:cNvPr id="75" name="Google Shape;75;g2778e5b14e3_0_78:notes"/>
           <p:cNvSpPr/>
           <p:nvPr>
             <p:ph idx="2" type="sldImg"/>
@@ -1460,7 +2454,7 @@
       </p:sp>
       <p:sp>
         <p:nvSpPr>
-          <p:cNvPr id="77" name="Google Shape;77;g2778e5b14e3_0_60:notes"/>
+          <p:cNvPr id="76" name="Google Shape;76;g2778e5b14e3_0_78:notes"/>
           <p:cNvSpPr txBox="1"/>
           <p:nvPr>
             <p:ph idx="1" type="body"/>
@@ -1510,7 +2504,7 @@
   <p:cSld>
     <p:spTree>
       <p:nvGrpSpPr>
-        <p:cNvPr id="81" name="Shape 81"/>
+        <p:cNvPr id="79" name="Shape 79"/>
         <p:cNvGrpSpPr/>
         <p:nvPr/>
       </p:nvGrpSpPr>
@@ -1524,7 +2518,7 @@
       </p:grpSpPr>
       <p:sp>
         <p:nvSpPr>
-          <p:cNvPr id="82" name="Google Shape;82;g2778e5b14e3_0_78:notes"/>
+          <p:cNvPr id="80" name="Google Shape;80;g277f6627ff2_0_5:notes"/>
           <p:cNvSpPr/>
           <p:nvPr>
             <p:ph idx="2" type="sldImg"/>
@@ -1559,7 +2553,7 @@
       </p:sp>
       <p:sp>
         <p:nvSpPr>
-          <p:cNvPr id="83" name="Google Shape;83;g2778e5b14e3_0_78:notes"/>
+          <p:cNvPr id="81" name="Google Shape;81;g277f6627ff2_0_5:notes"/>
           <p:cNvSpPr txBox="1"/>
           <p:nvPr>
             <p:ph idx="1" type="body"/>
@@ -1609,7 +2603,7 @@
   <p:cSld>
     <p:spTree>
       <p:nvGrpSpPr>
-        <p:cNvPr id="86" name="Shape 86"/>
+        <p:cNvPr id="90" name="Shape 90"/>
         <p:cNvGrpSpPr/>
         <p:nvPr/>
       </p:nvGrpSpPr>
@@ -1623,7 +2617,7 @@
       </p:grpSpPr>
       <p:sp>
         <p:nvSpPr>
-          <p:cNvPr id="87" name="Google Shape;87;g277f6627ff2_0_5:notes"/>
+          <p:cNvPr id="91" name="Google Shape;91;g277f6627ff2_0_35:notes"/>
           <p:cNvSpPr/>
           <p:nvPr>
             <p:ph idx="2" type="sldImg"/>
@@ -1658,7 +2652,7 @@
       </p:sp>
       <p:sp>
         <p:nvSpPr>
-          <p:cNvPr id="88" name="Google Shape;88;g277f6627ff2_0_5:notes"/>
+          <p:cNvPr id="92" name="Google Shape;92;g277f6627ff2_0_35:notes"/>
           <p:cNvSpPr txBox="1"/>
           <p:nvPr>
             <p:ph idx="1" type="body"/>
@@ -1708,7 +2702,7 @@
   <p:cSld>
     <p:spTree>
       <p:nvGrpSpPr>
-        <p:cNvPr id="97" name="Shape 97"/>
+        <p:cNvPr id="98" name="Shape 98"/>
         <p:cNvGrpSpPr/>
         <p:nvPr/>
       </p:nvGrpSpPr>
@@ -1722,7 +2716,7 @@
       </p:grpSpPr>
       <p:sp>
         <p:nvSpPr>
-          <p:cNvPr id="98" name="Google Shape;98;g277f6627ff2_0_35:notes"/>
+          <p:cNvPr id="99" name="Google Shape;99;g277f6627ff2_0_44:notes"/>
           <p:cNvSpPr/>
           <p:nvPr>
             <p:ph idx="2" type="sldImg"/>
@@ -1757,7 +2751,7 @@
       </p:sp>
       <p:sp>
         <p:nvSpPr>
-          <p:cNvPr id="99" name="Google Shape;99;g277f6627ff2_0_35:notes"/>
+          <p:cNvPr id="100" name="Google Shape;100;g277f6627ff2_0_44:notes"/>
           <p:cNvSpPr txBox="1"/>
           <p:nvPr>
             <p:ph idx="1" type="body"/>
@@ -1807,7 +2801,7 @@
   <p:cSld>
     <p:spTree>
       <p:nvGrpSpPr>
-        <p:cNvPr id="105" name="Shape 105"/>
+        <p:cNvPr id="103" name="Shape 103"/>
         <p:cNvGrpSpPr/>
         <p:nvPr/>
       </p:nvGrpSpPr>
@@ -1821,7 +2815,7 @@
       </p:grpSpPr>
       <p:sp>
         <p:nvSpPr>
-          <p:cNvPr id="106" name="Google Shape;106;g277f6627ff2_0_44:notes"/>
+          <p:cNvPr id="104" name="Google Shape;104;g277f6627ff2_0_89:notes"/>
           <p:cNvSpPr/>
           <p:nvPr>
             <p:ph idx="2" type="sldImg"/>
@@ -1856,7 +2850,7 @@
       </p:sp>
       <p:sp>
         <p:nvSpPr>
-          <p:cNvPr id="107" name="Google Shape;107;g277f6627ff2_0_44:notes"/>
+          <p:cNvPr id="105" name="Google Shape;105;g277f6627ff2_0_89:notes"/>
           <p:cNvSpPr txBox="1"/>
           <p:nvPr>
             <p:ph idx="1" type="body"/>
@@ -1906,7 +2900,7 @@
   <p:cSld>
     <p:spTree>
       <p:nvGrpSpPr>
-        <p:cNvPr id="110" name="Shape 110"/>
+        <p:cNvPr id="112" name="Shape 112"/>
         <p:cNvGrpSpPr/>
         <p:nvPr/>
       </p:nvGrpSpPr>
@@ -1920,7 +2914,7 @@
       </p:grpSpPr>
       <p:sp>
         <p:nvSpPr>
-          <p:cNvPr id="111" name="Google Shape;111;g277f6627ff2_0_89:notes"/>
+          <p:cNvPr id="113" name="Google Shape;113;g1e94be010bd_0_0:notes"/>
           <p:cNvSpPr/>
           <p:nvPr>
             <p:ph idx="2" type="sldImg"/>
@@ -1955,7 +2949,7 @@
       </p:sp>
       <p:sp>
         <p:nvSpPr>
-          <p:cNvPr id="112" name="Google Shape;112;g277f6627ff2_0_89:notes"/>
+          <p:cNvPr id="114" name="Google Shape;114;g1e94be010bd_0_0:notes"/>
           <p:cNvSpPr txBox="1"/>
           <p:nvPr>
             <p:ph idx="1" type="body"/>
@@ -7492,7 +8486,7 @@
   <p:cSld>
     <p:spTree>
       <p:nvGrpSpPr>
-        <p:cNvPr id="122" name="Shape 122"/>
+        <p:cNvPr id="123" name="Shape 123"/>
         <p:cNvGrpSpPr/>
         <p:nvPr/>
       </p:nvGrpSpPr>
@@ -7506,7 +8500,7 @@
       </p:grpSpPr>
       <p:pic>
         <p:nvPicPr>
-          <p:cNvPr id="123" name="Google Shape;123;p22"/>
+          <p:cNvPr id="124" name="Google Shape;124;p22"/>
           <p:cNvPicPr preferRelativeResize="0"/>
           <p:nvPr/>
         </p:nvPicPr>
@@ -7534,7 +8528,7 @@
       </p:pic>
       <p:sp>
         <p:nvSpPr>
-          <p:cNvPr id="124" name="Google Shape;124;p22"/>
+          <p:cNvPr id="125" name="Google Shape;125;p22"/>
           <p:cNvSpPr txBox="1"/>
           <p:nvPr/>
         </p:nvSpPr>
@@ -7586,7 +8580,7 @@
       </p:sp>
       <p:sp>
         <p:nvSpPr>
-          <p:cNvPr id="125" name="Google Shape;125;p22"/>
+          <p:cNvPr id="126" name="Google Shape;126;p22"/>
           <p:cNvSpPr txBox="1"/>
           <p:nvPr/>
         </p:nvSpPr>
@@ -7658,7 +8652,7 @@
   <p:cSld>
     <p:spTree>
       <p:nvGrpSpPr>
-        <p:cNvPr id="129" name="Shape 129"/>
+        <p:cNvPr id="130" name="Shape 130"/>
         <p:cNvGrpSpPr/>
         <p:nvPr/>
       </p:nvGrpSpPr>
@@ -7672,7 +8666,7 @@
       </p:grpSpPr>
       <p:sp>
         <p:nvSpPr>
-          <p:cNvPr id="130" name="Google Shape;130;p23"/>
+          <p:cNvPr id="131" name="Google Shape;131;p23"/>
           <p:cNvSpPr txBox="1"/>
           <p:nvPr>
             <p:ph idx="2" type="body"/>
@@ -7715,7 +8709,7 @@
       </p:sp>
       <p:pic>
         <p:nvPicPr>
-          <p:cNvPr id="131" name="Google Shape;131;p23"/>
+          <p:cNvPr id="132" name="Google Shape;132;p23"/>
           <p:cNvPicPr preferRelativeResize="0"/>
           <p:nvPr/>
         </p:nvPicPr>
@@ -7743,7 +8737,7 @@
       </p:pic>
       <p:pic>
         <p:nvPicPr>
-          <p:cNvPr id="132" name="Google Shape;132;p23"/>
+          <p:cNvPr id="133" name="Google Shape;133;p23"/>
           <p:cNvPicPr preferRelativeResize="0"/>
           <p:nvPr/>
         </p:nvPicPr>
@@ -7782,7 +8776,7 @@
   <p:cSld>
     <p:spTree>
       <p:nvGrpSpPr>
-        <p:cNvPr id="136" name="Shape 136"/>
+        <p:cNvPr id="137" name="Shape 137"/>
         <p:cNvGrpSpPr/>
         <p:nvPr/>
       </p:nvGrpSpPr>
@@ -7796,7 +8790,7 @@
       </p:grpSpPr>
       <p:sp>
         <p:nvSpPr>
-          <p:cNvPr id="137" name="Google Shape;137;p24"/>
+          <p:cNvPr id="138" name="Google Shape;138;p24"/>
           <p:cNvSpPr txBox="1"/>
           <p:nvPr>
             <p:ph idx="2" type="body"/>
@@ -7839,7 +8833,7 @@
       </p:sp>
       <p:pic>
         <p:nvPicPr>
-          <p:cNvPr id="138" name="Google Shape;138;p24"/>
+          <p:cNvPr id="139" name="Google Shape;139;p24"/>
           <p:cNvPicPr preferRelativeResize="0"/>
           <p:nvPr/>
         </p:nvPicPr>
@@ -7878,7 +8872,7 @@
   <p:cSld>
     <p:spTree>
       <p:nvGrpSpPr>
-        <p:cNvPr id="142" name="Shape 142"/>
+        <p:cNvPr id="143" name="Shape 143"/>
         <p:cNvGrpSpPr/>
         <p:nvPr/>
       </p:nvGrpSpPr>
@@ -7892,7 +8886,7 @@
       </p:grpSpPr>
       <p:sp>
         <p:nvSpPr>
-          <p:cNvPr id="143" name="Google Shape;143;p25"/>
+          <p:cNvPr id="144" name="Google Shape;144;p25"/>
           <p:cNvSpPr txBox="1"/>
           <p:nvPr>
             <p:ph idx="2" type="body"/>
@@ -7927,7 +8921,7 @@
             </a:pPr>
             <a:r>
               <a:rPr lang="es" sz="1700"/>
-              <a:t>De manera similar al slide anterior, este muestra las diferencias en los precios entre los barrios de la Ciudad Autónoma de Buenos Aires. Puerto Madero suele ser el barrio más caro de la ciudad por un amplio margen.</a:t>
+              <a:t>De manera similar al slide anterior, este muestra las diferencias en los precios entre los barrios de la Ciudad Autónoma de Buenos Aires. Puerto Madero suele ser el barrio más caro de la ciudad por un amplio margen</a:t>
             </a:r>
             <a:endParaRPr sz="1700"/>
           </a:p>
@@ -7935,7 +8929,7 @@
       </p:sp>
       <p:pic>
         <p:nvPicPr>
-          <p:cNvPr id="144" name="Google Shape;144;p25"/>
+          <p:cNvPr id="145" name="Google Shape;145;p25"/>
           <p:cNvPicPr preferRelativeResize="0"/>
           <p:nvPr/>
         </p:nvPicPr>
@@ -7951,6 +8945,1043 @@
           <a:xfrm>
             <a:off x="136600" y="1079288"/>
             <a:ext cx="4094500" cy="2984925"/>
+          </a:xfrm>
+          <a:prstGeom prst="rect">
+            <a:avLst/>
+          </a:prstGeom>
+          <a:noFill/>
+          <a:ln>
+            <a:noFill/>
+          </a:ln>
+        </p:spPr>
+      </p:pic>
+    </p:spTree>
+  </p:cSld>
+  <p:clrMapOvr>
+    <a:masterClrMapping/>
+  </p:clrMapOvr>
+</p:sld>
+</file>
+
+<file path=ppt/slides/slide14.xml><?xml version="1.0" encoding="utf-8"?>
+<p:sld xmlns:a="http://schemas.openxmlformats.org/drawingml/2006/main" xmlns:r="http://schemas.openxmlformats.org/officeDocument/2006/relationships" xmlns:mc="http://schemas.openxmlformats.org/markup-compatibility/2006" xmlns:mv="urn:schemas-microsoft-com:mac:vml" xmlns:p="http://schemas.openxmlformats.org/presentationml/2006/main" xmlns:c="http://schemas.openxmlformats.org/drawingml/2006/chart" xmlns:dgm="http://schemas.openxmlformats.org/drawingml/2006/diagram" xmlns:o="urn:schemas-microsoft-com:office:office" xmlns:v="urn:schemas-microsoft-com:vml" xmlns:pvml="urn:schemas-microsoft-com:office:powerpoint" xmlns:com="http://schemas.openxmlformats.org/drawingml/2006/compatibility" xmlns:p14="http://schemas.microsoft.com/office/powerpoint/2010/main" xmlns:p15="http://schemas.microsoft.com/office/powerpoint/2012/main" xmlns:ahyp="http://schemas.microsoft.com/office/drawing/2018/hyperlinkcolor">
+  <p:cSld>
+    <p:spTree>
+      <p:nvGrpSpPr>
+        <p:cNvPr id="149" name="Shape 149"/>
+        <p:cNvGrpSpPr/>
+        <p:nvPr/>
+      </p:nvGrpSpPr>
+      <p:grpSpPr>
+        <a:xfrm>
+          <a:off x="0" y="0"/>
+          <a:ext cx="0" cy="0"/>
+          <a:chOff x="0" y="0"/>
+          <a:chExt cx="0" cy="0"/>
+        </a:xfrm>
+      </p:grpSpPr>
+      <p:pic>
+        <p:nvPicPr>
+          <p:cNvPr id="150" name="Google Shape;150;p26"/>
+          <p:cNvPicPr preferRelativeResize="0"/>
+          <p:nvPr/>
+        </p:nvPicPr>
+        <p:blipFill>
+          <a:blip r:embed="rId3">
+            <a:alphaModFix/>
+          </a:blip>
+          <a:stretch>
+            <a:fillRect/>
+          </a:stretch>
+        </p:blipFill>
+        <p:spPr>
+          <a:xfrm>
+            <a:off x="408824" y="531687"/>
+            <a:ext cx="3590800" cy="4080125"/>
+          </a:xfrm>
+          <a:prstGeom prst="rect">
+            <a:avLst/>
+          </a:prstGeom>
+          <a:noFill/>
+          <a:ln>
+            <a:noFill/>
+          </a:ln>
+        </p:spPr>
+      </p:pic>
+      <p:sp>
+        <p:nvSpPr>
+          <p:cNvPr id="151" name="Google Shape;151;p26"/>
+          <p:cNvSpPr txBox="1"/>
+          <p:nvPr>
+            <p:ph idx="2" type="body"/>
+          </p:nvPr>
+        </p:nvSpPr>
+        <p:spPr>
+          <a:xfrm>
+            <a:off x="4924425" y="724188"/>
+            <a:ext cx="3837000" cy="3695100"/>
+          </a:xfrm>
+          <a:prstGeom prst="rect">
+            <a:avLst/>
+          </a:prstGeom>
+        </p:spPr>
+        <p:txBody>
+          <a:bodyPr anchorCtr="0" anchor="ctr" bIns="91425" lIns="91425" spcFirstLastPara="1" rIns="91425" wrap="square" tIns="91425">
+            <a:normAutofit/>
+          </a:bodyPr>
+          <a:lstStyle/>
+          <a:p>
+            <a:pPr indent="0" lvl="0" marL="0" rtl="0" algn="l">
+              <a:lnSpc>
+                <a:spcPct val="150000"/>
+              </a:lnSpc>
+              <a:spcBef>
+                <a:spcPts val="0"/>
+              </a:spcBef>
+              <a:spcAft>
+                <a:spcPts val="1200"/>
+              </a:spcAft>
+              <a:buNone/>
+            </a:pPr>
+            <a:r>
+              <a:rPr lang="es" sz="1700"/>
+              <a:t>Este gráfico muestra el mapa de todos los municipios del Área Metropolitana de Buenos Aires. Cuanto más rojo es el municipio, mayor es el promedio del precio de venta de los inmuebles. Se puede visualizar un bajo precio en la zona oeste y alto en la zona norte del Gran Buenos Aires</a:t>
+            </a:r>
+            <a:endParaRPr sz="1700"/>
+          </a:p>
+        </p:txBody>
+      </p:sp>
+      <p:pic>
+        <p:nvPicPr>
+          <p:cNvPr id="152" name="Google Shape;152;p26"/>
+          <p:cNvPicPr preferRelativeResize="0"/>
+          <p:nvPr/>
+        </p:nvPicPr>
+        <p:blipFill>
+          <a:blip r:embed="rId4">
+            <a:alphaModFix/>
+          </a:blip>
+          <a:stretch>
+            <a:fillRect/>
+          </a:stretch>
+        </p:blipFill>
+        <p:spPr>
+          <a:xfrm>
+            <a:off x="335587" y="4496263"/>
+            <a:ext cx="3737265" cy="419413"/>
+          </a:xfrm>
+          <a:prstGeom prst="rect">
+            <a:avLst/>
+          </a:prstGeom>
+          <a:noFill/>
+          <a:ln>
+            <a:noFill/>
+          </a:ln>
+        </p:spPr>
+      </p:pic>
+    </p:spTree>
+  </p:cSld>
+  <p:clrMapOvr>
+    <a:masterClrMapping/>
+  </p:clrMapOvr>
+</p:sld>
+</file>
+
+<file path=ppt/slides/slide15.xml><?xml version="1.0" encoding="utf-8"?>
+<p:sld xmlns:a="http://schemas.openxmlformats.org/drawingml/2006/main" xmlns:r="http://schemas.openxmlformats.org/officeDocument/2006/relationships" xmlns:mc="http://schemas.openxmlformats.org/markup-compatibility/2006" xmlns:mv="urn:schemas-microsoft-com:mac:vml" xmlns:p="http://schemas.openxmlformats.org/presentationml/2006/main" xmlns:c="http://schemas.openxmlformats.org/drawingml/2006/chart" xmlns:dgm="http://schemas.openxmlformats.org/drawingml/2006/diagram" xmlns:o="urn:schemas-microsoft-com:office:office" xmlns:v="urn:schemas-microsoft-com:vml" xmlns:pvml="urn:schemas-microsoft-com:office:powerpoint" xmlns:com="http://schemas.openxmlformats.org/drawingml/2006/compatibility" xmlns:p14="http://schemas.microsoft.com/office/powerpoint/2010/main" xmlns:p15="http://schemas.microsoft.com/office/powerpoint/2012/main" xmlns:ahyp="http://schemas.microsoft.com/office/drawing/2018/hyperlinkcolor">
+  <p:cSld>
+    <p:spTree>
+      <p:nvGrpSpPr>
+        <p:cNvPr id="156" name="Shape 156"/>
+        <p:cNvGrpSpPr/>
+        <p:nvPr/>
+      </p:nvGrpSpPr>
+      <p:grpSpPr>
+        <a:xfrm>
+          <a:off x="0" y="0"/>
+          <a:ext cx="0" cy="0"/>
+          <a:chOff x="0" y="0"/>
+          <a:chExt cx="0" cy="0"/>
+        </a:xfrm>
+      </p:grpSpPr>
+      <p:sp>
+        <p:nvSpPr>
+          <p:cNvPr id="157" name="Google Shape;157;p27"/>
+          <p:cNvSpPr txBox="1"/>
+          <p:nvPr>
+            <p:ph idx="2" type="body"/>
+          </p:nvPr>
+        </p:nvSpPr>
+        <p:spPr>
+          <a:xfrm>
+            <a:off x="4924400" y="1346250"/>
+            <a:ext cx="3837000" cy="2451000"/>
+          </a:xfrm>
+          <a:prstGeom prst="rect">
+            <a:avLst/>
+          </a:prstGeom>
+        </p:spPr>
+        <p:txBody>
+          <a:bodyPr anchorCtr="0" anchor="ctr" bIns="91425" lIns="91425" spcFirstLastPara="1" rIns="91425" wrap="square" tIns="91425">
+            <a:normAutofit/>
+          </a:bodyPr>
+          <a:lstStyle/>
+          <a:p>
+            <a:pPr indent="0" lvl="0" marL="0" rtl="0" algn="l">
+              <a:lnSpc>
+                <a:spcPct val="150000"/>
+              </a:lnSpc>
+              <a:spcBef>
+                <a:spcPts val="0"/>
+              </a:spcBef>
+              <a:spcAft>
+                <a:spcPts val="1200"/>
+              </a:spcAft>
+              <a:buNone/>
+            </a:pPr>
+            <a:r>
+              <a:rPr lang="es"/>
+              <a:t>La matriz de correlación muestra que las variables que mayor relación tienen con el precio son las superficie cubierta, la cantidad de cuartos y la cantidad de baños</a:t>
+            </a:r>
+            <a:endParaRPr/>
+          </a:p>
+        </p:txBody>
+      </p:sp>
+      <p:pic>
+        <p:nvPicPr>
+          <p:cNvPr id="158" name="Google Shape;158;p27"/>
+          <p:cNvPicPr preferRelativeResize="0"/>
+          <p:nvPr/>
+        </p:nvPicPr>
+        <p:blipFill>
+          <a:blip r:embed="rId3">
+            <a:alphaModFix/>
+          </a:blip>
+          <a:stretch>
+            <a:fillRect/>
+          </a:stretch>
+        </p:blipFill>
+        <p:spPr>
+          <a:xfrm>
+            <a:off x="49625" y="622175"/>
+            <a:ext cx="4415126" cy="3899151"/>
+          </a:xfrm>
+          <a:prstGeom prst="rect">
+            <a:avLst/>
+          </a:prstGeom>
+          <a:noFill/>
+          <a:ln>
+            <a:noFill/>
+          </a:ln>
+        </p:spPr>
+      </p:pic>
+    </p:spTree>
+  </p:cSld>
+  <p:clrMapOvr>
+    <a:masterClrMapping/>
+  </p:clrMapOvr>
+</p:sld>
+</file>
+
+<file path=ppt/slides/slide16.xml><?xml version="1.0" encoding="utf-8"?>
+<p:sld xmlns:a="http://schemas.openxmlformats.org/drawingml/2006/main" xmlns:r="http://schemas.openxmlformats.org/officeDocument/2006/relationships" xmlns:mc="http://schemas.openxmlformats.org/markup-compatibility/2006" xmlns:mv="urn:schemas-microsoft-com:mac:vml" xmlns:p="http://schemas.openxmlformats.org/presentationml/2006/main" xmlns:c="http://schemas.openxmlformats.org/drawingml/2006/chart" xmlns:dgm="http://schemas.openxmlformats.org/drawingml/2006/diagram" xmlns:o="urn:schemas-microsoft-com:office:office" xmlns:v="urn:schemas-microsoft-com:vml" xmlns:pvml="urn:schemas-microsoft-com:office:powerpoint" xmlns:com="http://schemas.openxmlformats.org/drawingml/2006/compatibility" xmlns:p14="http://schemas.microsoft.com/office/powerpoint/2010/main" xmlns:p15="http://schemas.microsoft.com/office/powerpoint/2012/main" xmlns:ahyp="http://schemas.microsoft.com/office/drawing/2018/hyperlinkcolor">
+  <p:cSld>
+    <p:spTree>
+      <p:nvGrpSpPr>
+        <p:cNvPr id="162" name="Shape 162"/>
+        <p:cNvGrpSpPr/>
+        <p:nvPr/>
+      </p:nvGrpSpPr>
+      <p:grpSpPr>
+        <a:xfrm>
+          <a:off x="0" y="0"/>
+          <a:ext cx="0" cy="0"/>
+          <a:chOff x="0" y="0"/>
+          <a:chExt cx="0" cy="0"/>
+        </a:xfrm>
+      </p:grpSpPr>
+      <p:sp>
+        <p:nvSpPr>
+          <p:cNvPr id="163" name="Google Shape;163;p28"/>
+          <p:cNvSpPr txBox="1"/>
+          <p:nvPr>
+            <p:ph type="title"/>
+          </p:nvPr>
+        </p:nvSpPr>
+        <p:spPr>
+          <a:xfrm>
+            <a:off x="510450" y="2057400"/>
+            <a:ext cx="8123100" cy="778800"/>
+          </a:xfrm>
+          <a:prstGeom prst="rect">
+            <a:avLst/>
+          </a:prstGeom>
+        </p:spPr>
+        <p:txBody>
+          <a:bodyPr anchorCtr="0" anchor="b" bIns="91425" lIns="91425" spcFirstLastPara="1" rIns="91425" wrap="square" tIns="91425">
+            <a:normAutofit/>
+          </a:bodyPr>
+          <a:lstStyle/>
+          <a:p>
+            <a:pPr indent="0" lvl="0" marL="0" rtl="0" algn="l">
+              <a:spcBef>
+                <a:spcPts val="0"/>
+              </a:spcBef>
+              <a:spcAft>
+                <a:spcPts val="0"/>
+              </a:spcAft>
+              <a:buNone/>
+            </a:pPr>
+            <a:r>
+              <a:rPr lang="es"/>
+              <a:t>Data Prediction</a:t>
+            </a:r>
+            <a:endParaRPr/>
+          </a:p>
+        </p:txBody>
+      </p:sp>
+    </p:spTree>
+  </p:cSld>
+  <p:clrMapOvr>
+    <a:masterClrMapping/>
+  </p:clrMapOvr>
+</p:sld>
+</file>
+
+<file path=ppt/slides/slide17.xml><?xml version="1.0" encoding="utf-8"?>
+<p:sld xmlns:a="http://schemas.openxmlformats.org/drawingml/2006/main" xmlns:r="http://schemas.openxmlformats.org/officeDocument/2006/relationships" xmlns:mc="http://schemas.openxmlformats.org/markup-compatibility/2006" xmlns:mv="urn:schemas-microsoft-com:mac:vml" xmlns:p="http://schemas.openxmlformats.org/presentationml/2006/main" xmlns:c="http://schemas.openxmlformats.org/drawingml/2006/chart" xmlns:dgm="http://schemas.openxmlformats.org/drawingml/2006/diagram" xmlns:o="urn:schemas-microsoft-com:office:office" xmlns:v="urn:schemas-microsoft-com:vml" xmlns:pvml="urn:schemas-microsoft-com:office:powerpoint" xmlns:com="http://schemas.openxmlformats.org/drawingml/2006/compatibility" xmlns:p14="http://schemas.microsoft.com/office/powerpoint/2010/main" xmlns:p15="http://schemas.microsoft.com/office/powerpoint/2012/main" xmlns:ahyp="http://schemas.microsoft.com/office/drawing/2018/hyperlinkcolor">
+  <p:cSld>
+    <p:spTree>
+      <p:nvGrpSpPr>
+        <p:cNvPr id="167" name="Shape 167"/>
+        <p:cNvGrpSpPr/>
+        <p:nvPr/>
+      </p:nvGrpSpPr>
+      <p:grpSpPr>
+        <a:xfrm>
+          <a:off x="0" y="0"/>
+          <a:ext cx="0" cy="0"/>
+          <a:chOff x="0" y="0"/>
+          <a:chExt cx="0" cy="0"/>
+        </a:xfrm>
+      </p:grpSpPr>
+      <p:sp>
+        <p:nvSpPr>
+          <p:cNvPr id="168" name="Google Shape;168;p29"/>
+          <p:cNvSpPr txBox="1"/>
+          <p:nvPr/>
+        </p:nvSpPr>
+        <p:spPr>
+          <a:xfrm>
+            <a:off x="767525" y="180025"/>
+            <a:ext cx="3011700" cy="561900"/>
+          </a:xfrm>
+          <a:prstGeom prst="rect">
+            <a:avLst/>
+          </a:prstGeom>
+          <a:noFill/>
+          <a:ln>
+            <a:noFill/>
+          </a:ln>
+        </p:spPr>
+        <p:txBody>
+          <a:bodyPr anchorCtr="0" anchor="t" bIns="91425" lIns="91425" spcFirstLastPara="1" rIns="91425" wrap="square" tIns="91425">
+            <a:noAutofit/>
+          </a:bodyPr>
+          <a:lstStyle/>
+          <a:p>
+            <a:pPr indent="0" lvl="0" marL="0" rtl="0" algn="l">
+              <a:spcBef>
+                <a:spcPts val="0"/>
+              </a:spcBef>
+              <a:spcAft>
+                <a:spcPts val="0"/>
+              </a:spcAft>
+              <a:buNone/>
+            </a:pPr>
+            <a:r>
+              <a:rPr b="1" lang="es" sz="2700">
+                <a:latin typeface="Proxima Nova"/>
+                <a:ea typeface="Proxima Nova"/>
+                <a:cs typeface="Proxima Nova"/>
+                <a:sym typeface="Proxima Nova"/>
+              </a:rPr>
+              <a:t>Regresión Lineal</a:t>
+            </a:r>
+            <a:endParaRPr b="1" sz="2700">
+              <a:latin typeface="Proxima Nova"/>
+              <a:ea typeface="Proxima Nova"/>
+              <a:cs typeface="Proxima Nova"/>
+              <a:sym typeface="Proxima Nova"/>
+            </a:endParaRPr>
+          </a:p>
+        </p:txBody>
+      </p:sp>
+      <p:pic>
+        <p:nvPicPr>
+          <p:cNvPr id="169" name="Google Shape;169;p29"/>
+          <p:cNvPicPr preferRelativeResize="0"/>
+          <p:nvPr/>
+        </p:nvPicPr>
+        <p:blipFill>
+          <a:blip r:embed="rId3">
+            <a:alphaModFix/>
+          </a:blip>
+          <a:stretch>
+            <a:fillRect/>
+          </a:stretch>
+        </p:blipFill>
+        <p:spPr>
+          <a:xfrm>
+            <a:off x="168725" y="1109800"/>
+            <a:ext cx="4133850" cy="561975"/>
+          </a:xfrm>
+          <a:prstGeom prst="rect">
+            <a:avLst/>
+          </a:prstGeom>
+          <a:noFill/>
+          <a:ln>
+            <a:noFill/>
+          </a:ln>
+        </p:spPr>
+      </p:pic>
+      <p:pic>
+        <p:nvPicPr>
+          <p:cNvPr id="170" name="Google Shape;170;p29"/>
+          <p:cNvPicPr preferRelativeResize="0"/>
+          <p:nvPr/>
+        </p:nvPicPr>
+        <p:blipFill>
+          <a:blip r:embed="rId4">
+            <a:alphaModFix/>
+          </a:blip>
+          <a:stretch>
+            <a:fillRect/>
+          </a:stretch>
+        </p:blipFill>
+        <p:spPr>
+          <a:xfrm>
+            <a:off x="5033625" y="2688075"/>
+            <a:ext cx="3080476" cy="2247275"/>
+          </a:xfrm>
+          <a:prstGeom prst="rect">
+            <a:avLst/>
+          </a:prstGeom>
+          <a:noFill/>
+          <a:ln>
+            <a:noFill/>
+          </a:ln>
+        </p:spPr>
+      </p:pic>
+      <p:pic>
+        <p:nvPicPr>
+          <p:cNvPr id="171" name="Google Shape;171;p29"/>
+          <p:cNvPicPr preferRelativeResize="0"/>
+          <p:nvPr/>
+        </p:nvPicPr>
+        <p:blipFill>
+          <a:blip r:embed="rId5">
+            <a:alphaModFix/>
+          </a:blip>
+          <a:stretch>
+            <a:fillRect/>
+          </a:stretch>
+        </p:blipFill>
+        <p:spPr>
+          <a:xfrm>
+            <a:off x="5033625" y="180025"/>
+            <a:ext cx="3080481" cy="2337900"/>
+          </a:xfrm>
+          <a:prstGeom prst="rect">
+            <a:avLst/>
+          </a:prstGeom>
+          <a:noFill/>
+          <a:ln>
+            <a:noFill/>
+          </a:ln>
+        </p:spPr>
+      </p:pic>
+      <p:sp>
+        <p:nvSpPr>
+          <p:cNvPr id="172" name="Google Shape;172;p29"/>
+          <p:cNvSpPr txBox="1"/>
+          <p:nvPr/>
+        </p:nvSpPr>
+        <p:spPr>
+          <a:xfrm>
+            <a:off x="346475" y="2039650"/>
+            <a:ext cx="3853800" cy="2337900"/>
+          </a:xfrm>
+          <a:prstGeom prst="rect">
+            <a:avLst/>
+          </a:prstGeom>
+          <a:noFill/>
+          <a:ln>
+            <a:noFill/>
+          </a:ln>
+        </p:spPr>
+        <p:txBody>
+          <a:bodyPr anchorCtr="0" anchor="t" bIns="91425" lIns="91425" spcFirstLastPara="1" rIns="91425" wrap="square" tIns="91425">
+            <a:noAutofit/>
+          </a:bodyPr>
+          <a:lstStyle/>
+          <a:p>
+            <a:pPr indent="0" lvl="0" marL="0" rtl="0" algn="ctr">
+              <a:lnSpc>
+                <a:spcPct val="150000"/>
+              </a:lnSpc>
+              <a:spcBef>
+                <a:spcPts val="0"/>
+              </a:spcBef>
+              <a:spcAft>
+                <a:spcPts val="0"/>
+              </a:spcAft>
+              <a:buNone/>
+            </a:pPr>
+            <a:r>
+              <a:rPr lang="es">
+                <a:latin typeface="Proxima Nova"/>
+                <a:ea typeface="Proxima Nova"/>
+                <a:cs typeface="Proxima Nova"/>
+                <a:sym typeface="Proxima Nova"/>
+              </a:rPr>
+              <a:t>El modelo de regresión lineal arroja un resultado de r2 de 0.64 y un MAE (Error Absoluto Medio) de 59,813.</a:t>
+            </a:r>
+            <a:endParaRPr>
+              <a:latin typeface="Proxima Nova"/>
+              <a:ea typeface="Proxima Nova"/>
+              <a:cs typeface="Proxima Nova"/>
+              <a:sym typeface="Proxima Nova"/>
+            </a:endParaRPr>
+          </a:p>
+          <a:p>
+            <a:pPr indent="0" lvl="0" marL="0" rtl="0" algn="ctr">
+              <a:lnSpc>
+                <a:spcPct val="150000"/>
+              </a:lnSpc>
+              <a:spcBef>
+                <a:spcPts val="0"/>
+              </a:spcBef>
+              <a:spcAft>
+                <a:spcPts val="0"/>
+              </a:spcAft>
+              <a:buNone/>
+            </a:pPr>
+            <a:r>
+              <a:t/>
+            </a:r>
+            <a:endParaRPr>
+              <a:latin typeface="Proxima Nova"/>
+              <a:ea typeface="Proxima Nova"/>
+              <a:cs typeface="Proxima Nova"/>
+              <a:sym typeface="Proxima Nova"/>
+            </a:endParaRPr>
+          </a:p>
+          <a:p>
+            <a:pPr indent="0" lvl="0" marL="0" rtl="0" algn="ctr">
+              <a:lnSpc>
+                <a:spcPct val="150000"/>
+              </a:lnSpc>
+              <a:spcBef>
+                <a:spcPts val="0"/>
+              </a:spcBef>
+              <a:spcAft>
+                <a:spcPts val="0"/>
+              </a:spcAft>
+              <a:buNone/>
+            </a:pPr>
+            <a:r>
+              <a:rPr lang="es">
+                <a:latin typeface="Proxima Nova"/>
+                <a:ea typeface="Proxima Nova"/>
+                <a:cs typeface="Proxima Nova"/>
+                <a:sym typeface="Proxima Nova"/>
+              </a:rPr>
+              <a:t>Este resultado es bajo, así que se analizarán otros modelos de regresión para predecir nuestra variable objetivo</a:t>
+            </a:r>
+            <a:endParaRPr>
+              <a:latin typeface="Proxima Nova"/>
+              <a:ea typeface="Proxima Nova"/>
+              <a:cs typeface="Proxima Nova"/>
+              <a:sym typeface="Proxima Nova"/>
+            </a:endParaRPr>
+          </a:p>
+        </p:txBody>
+      </p:sp>
+    </p:spTree>
+  </p:cSld>
+  <p:clrMapOvr>
+    <a:masterClrMapping/>
+  </p:clrMapOvr>
+</p:sld>
+</file>
+
+<file path=ppt/slides/slide18.xml><?xml version="1.0" encoding="utf-8"?>
+<p:sld xmlns:a="http://schemas.openxmlformats.org/drawingml/2006/main" xmlns:r="http://schemas.openxmlformats.org/officeDocument/2006/relationships" xmlns:mc="http://schemas.openxmlformats.org/markup-compatibility/2006" xmlns:mv="urn:schemas-microsoft-com:mac:vml" xmlns:p="http://schemas.openxmlformats.org/presentationml/2006/main" xmlns:c="http://schemas.openxmlformats.org/drawingml/2006/chart" xmlns:dgm="http://schemas.openxmlformats.org/drawingml/2006/diagram" xmlns:o="urn:schemas-microsoft-com:office:office" xmlns:v="urn:schemas-microsoft-com:vml" xmlns:pvml="urn:schemas-microsoft-com:office:powerpoint" xmlns:com="http://schemas.openxmlformats.org/drawingml/2006/compatibility" xmlns:p14="http://schemas.microsoft.com/office/powerpoint/2010/main" xmlns:p15="http://schemas.microsoft.com/office/powerpoint/2012/main" xmlns:ahyp="http://schemas.microsoft.com/office/drawing/2018/hyperlinkcolor">
+  <p:cSld>
+    <p:spTree>
+      <p:nvGrpSpPr>
+        <p:cNvPr id="176" name="Shape 176"/>
+        <p:cNvGrpSpPr/>
+        <p:nvPr/>
+      </p:nvGrpSpPr>
+      <p:grpSpPr>
+        <a:xfrm>
+          <a:off x="0" y="0"/>
+          <a:ext cx="0" cy="0"/>
+          <a:chOff x="0" y="0"/>
+          <a:chExt cx="0" cy="0"/>
+        </a:xfrm>
+      </p:grpSpPr>
+      <p:sp>
+        <p:nvSpPr>
+          <p:cNvPr id="177" name="Google Shape;177;p30"/>
+          <p:cNvSpPr txBox="1"/>
+          <p:nvPr/>
+        </p:nvSpPr>
+        <p:spPr>
+          <a:xfrm>
+            <a:off x="254550" y="269100"/>
+            <a:ext cx="4098900" cy="561900"/>
+          </a:xfrm>
+          <a:prstGeom prst="rect">
+            <a:avLst/>
+          </a:prstGeom>
+          <a:noFill/>
+          <a:ln>
+            <a:noFill/>
+          </a:ln>
+        </p:spPr>
+        <p:txBody>
+          <a:bodyPr anchorCtr="0" anchor="t" bIns="91425" lIns="91425" spcFirstLastPara="1" rIns="91425" wrap="square" tIns="91425">
+            <a:noAutofit/>
+          </a:bodyPr>
+          <a:lstStyle/>
+          <a:p>
+            <a:pPr indent="0" lvl="0" marL="0" rtl="0" algn="l">
+              <a:spcBef>
+                <a:spcPts val="0"/>
+              </a:spcBef>
+              <a:spcAft>
+                <a:spcPts val="0"/>
+              </a:spcAft>
+              <a:buNone/>
+            </a:pPr>
+            <a:r>
+              <a:rPr b="1" lang="es" sz="2700">
+                <a:latin typeface="Proxima Nova"/>
+                <a:ea typeface="Proxima Nova"/>
+                <a:cs typeface="Proxima Nova"/>
+                <a:sym typeface="Proxima Nova"/>
+              </a:rPr>
+              <a:t>Decision Tree Regressor</a:t>
+            </a:r>
+            <a:endParaRPr b="1" sz="2700">
+              <a:latin typeface="Proxima Nova"/>
+              <a:ea typeface="Proxima Nova"/>
+              <a:cs typeface="Proxima Nova"/>
+              <a:sym typeface="Proxima Nova"/>
+            </a:endParaRPr>
+          </a:p>
+        </p:txBody>
+      </p:sp>
+      <p:sp>
+        <p:nvSpPr>
+          <p:cNvPr id="178" name="Google Shape;178;p30"/>
+          <p:cNvSpPr txBox="1"/>
+          <p:nvPr/>
+        </p:nvSpPr>
+        <p:spPr>
+          <a:xfrm>
+            <a:off x="377100" y="2541575"/>
+            <a:ext cx="3853800" cy="2337900"/>
+          </a:xfrm>
+          <a:prstGeom prst="rect">
+            <a:avLst/>
+          </a:prstGeom>
+          <a:noFill/>
+          <a:ln>
+            <a:noFill/>
+          </a:ln>
+        </p:spPr>
+        <p:txBody>
+          <a:bodyPr anchorCtr="0" anchor="t" bIns="91425" lIns="91425" spcFirstLastPara="1" rIns="91425" wrap="square" tIns="91425">
+            <a:noAutofit/>
+          </a:bodyPr>
+          <a:lstStyle/>
+          <a:p>
+            <a:pPr indent="0" lvl="0" marL="0" rtl="0" algn="ctr">
+              <a:lnSpc>
+                <a:spcPct val="150000"/>
+              </a:lnSpc>
+              <a:spcBef>
+                <a:spcPts val="0"/>
+              </a:spcBef>
+              <a:spcAft>
+                <a:spcPts val="0"/>
+              </a:spcAft>
+              <a:buNone/>
+            </a:pPr>
+            <a:r>
+              <a:rPr lang="es">
+                <a:latin typeface="Proxima Nova"/>
+                <a:ea typeface="Proxima Nova"/>
+                <a:cs typeface="Proxima Nova"/>
+                <a:sym typeface="Proxima Nova"/>
+              </a:rPr>
+              <a:t>El modelo de árbol de decisión arroja un resultado mejor al de regresión lineal. El r2 es de 0.82 y el MAE es de 30.883.</a:t>
+            </a:r>
+            <a:endParaRPr>
+              <a:latin typeface="Proxima Nova"/>
+              <a:ea typeface="Proxima Nova"/>
+              <a:cs typeface="Proxima Nova"/>
+              <a:sym typeface="Proxima Nova"/>
+            </a:endParaRPr>
+          </a:p>
+          <a:p>
+            <a:pPr indent="0" lvl="0" marL="0" rtl="0" algn="ctr">
+              <a:lnSpc>
+                <a:spcPct val="150000"/>
+              </a:lnSpc>
+              <a:spcBef>
+                <a:spcPts val="0"/>
+              </a:spcBef>
+              <a:spcAft>
+                <a:spcPts val="0"/>
+              </a:spcAft>
+              <a:buNone/>
+            </a:pPr>
+            <a:r>
+              <a:t/>
+            </a:r>
+            <a:endParaRPr>
+              <a:latin typeface="Proxima Nova"/>
+              <a:ea typeface="Proxima Nova"/>
+              <a:cs typeface="Proxima Nova"/>
+              <a:sym typeface="Proxima Nova"/>
+            </a:endParaRPr>
+          </a:p>
+          <a:p>
+            <a:pPr indent="0" lvl="0" marL="0" rtl="0" algn="ctr">
+              <a:lnSpc>
+                <a:spcPct val="150000"/>
+              </a:lnSpc>
+              <a:spcBef>
+                <a:spcPts val="0"/>
+              </a:spcBef>
+              <a:spcAft>
+                <a:spcPts val="0"/>
+              </a:spcAft>
+              <a:buNone/>
+            </a:pPr>
+            <a:r>
+              <a:rPr lang="es">
+                <a:latin typeface="Proxima Nova"/>
+                <a:ea typeface="Proxima Nova"/>
+                <a:cs typeface="Proxima Nova"/>
+                <a:sym typeface="Proxima Nova"/>
+              </a:rPr>
+              <a:t>Aún así, los resultados son mejorables.</a:t>
+            </a:r>
+            <a:endParaRPr>
+              <a:latin typeface="Proxima Nova"/>
+              <a:ea typeface="Proxima Nova"/>
+              <a:cs typeface="Proxima Nova"/>
+              <a:sym typeface="Proxima Nova"/>
+            </a:endParaRPr>
+          </a:p>
+        </p:txBody>
+      </p:sp>
+      <p:pic>
+        <p:nvPicPr>
+          <p:cNvPr id="179" name="Google Shape;179;p30"/>
+          <p:cNvPicPr preferRelativeResize="0"/>
+          <p:nvPr/>
+        </p:nvPicPr>
+        <p:blipFill>
+          <a:blip r:embed="rId3">
+            <a:alphaModFix/>
+          </a:blip>
+          <a:stretch>
+            <a:fillRect/>
+          </a:stretch>
+        </p:blipFill>
+        <p:spPr>
+          <a:xfrm>
+            <a:off x="241838" y="1462450"/>
+            <a:ext cx="4124325" cy="447675"/>
+          </a:xfrm>
+          <a:prstGeom prst="rect">
+            <a:avLst/>
+          </a:prstGeom>
+          <a:noFill/>
+          <a:ln>
+            <a:noFill/>
+          </a:ln>
+        </p:spPr>
+      </p:pic>
+      <p:pic>
+        <p:nvPicPr>
+          <p:cNvPr id="180" name="Google Shape;180;p30"/>
+          <p:cNvPicPr preferRelativeResize="0"/>
+          <p:nvPr/>
+        </p:nvPicPr>
+        <p:blipFill>
+          <a:blip r:embed="rId4">
+            <a:alphaModFix/>
+          </a:blip>
+          <a:stretch>
+            <a:fillRect/>
+          </a:stretch>
+        </p:blipFill>
+        <p:spPr>
+          <a:xfrm>
+            <a:off x="5016800" y="2658325"/>
+            <a:ext cx="3249999" cy="2251375"/>
+          </a:xfrm>
+          <a:prstGeom prst="rect">
+            <a:avLst/>
+          </a:prstGeom>
+          <a:noFill/>
+          <a:ln>
+            <a:noFill/>
+          </a:ln>
+        </p:spPr>
+      </p:pic>
+      <p:pic>
+        <p:nvPicPr>
+          <p:cNvPr id="181" name="Google Shape;181;p30"/>
+          <p:cNvPicPr preferRelativeResize="0"/>
+          <p:nvPr/>
+        </p:nvPicPr>
+        <p:blipFill>
+          <a:blip r:embed="rId5">
+            <a:alphaModFix/>
+          </a:blip>
+          <a:stretch>
+            <a:fillRect/>
+          </a:stretch>
+        </p:blipFill>
+        <p:spPr>
+          <a:xfrm>
+            <a:off x="5016800" y="96475"/>
+            <a:ext cx="3250000" cy="2400275"/>
+          </a:xfrm>
+          <a:prstGeom prst="rect">
+            <a:avLst/>
+          </a:prstGeom>
+          <a:noFill/>
+          <a:ln>
+            <a:noFill/>
+          </a:ln>
+        </p:spPr>
+      </p:pic>
+    </p:spTree>
+  </p:cSld>
+  <p:clrMapOvr>
+    <a:masterClrMapping/>
+  </p:clrMapOvr>
+</p:sld>
+</file>
+
+<file path=ppt/slides/slide19.xml><?xml version="1.0" encoding="utf-8"?>
+<p:sld xmlns:a="http://schemas.openxmlformats.org/drawingml/2006/main" xmlns:r="http://schemas.openxmlformats.org/officeDocument/2006/relationships" xmlns:mc="http://schemas.openxmlformats.org/markup-compatibility/2006" xmlns:mv="urn:schemas-microsoft-com:mac:vml" xmlns:p="http://schemas.openxmlformats.org/presentationml/2006/main" xmlns:c="http://schemas.openxmlformats.org/drawingml/2006/chart" xmlns:dgm="http://schemas.openxmlformats.org/drawingml/2006/diagram" xmlns:o="urn:schemas-microsoft-com:office:office" xmlns:v="urn:schemas-microsoft-com:vml" xmlns:pvml="urn:schemas-microsoft-com:office:powerpoint" xmlns:com="http://schemas.openxmlformats.org/drawingml/2006/compatibility" xmlns:p14="http://schemas.microsoft.com/office/powerpoint/2010/main" xmlns:p15="http://schemas.microsoft.com/office/powerpoint/2012/main" xmlns:ahyp="http://schemas.microsoft.com/office/drawing/2018/hyperlinkcolor">
+  <p:cSld>
+    <p:spTree>
+      <p:nvGrpSpPr>
+        <p:cNvPr id="185" name="Shape 185"/>
+        <p:cNvGrpSpPr/>
+        <p:nvPr/>
+      </p:nvGrpSpPr>
+      <p:grpSpPr>
+        <a:xfrm>
+          <a:off x="0" y="0"/>
+          <a:ext cx="0" cy="0"/>
+          <a:chOff x="0" y="0"/>
+          <a:chExt cx="0" cy="0"/>
+        </a:xfrm>
+      </p:grpSpPr>
+      <p:sp>
+        <p:nvSpPr>
+          <p:cNvPr id="186" name="Google Shape;186;p31"/>
+          <p:cNvSpPr txBox="1"/>
+          <p:nvPr/>
+        </p:nvSpPr>
+        <p:spPr>
+          <a:xfrm>
+            <a:off x="402600" y="291750"/>
+            <a:ext cx="3802800" cy="561900"/>
+          </a:xfrm>
+          <a:prstGeom prst="rect">
+            <a:avLst/>
+          </a:prstGeom>
+          <a:noFill/>
+          <a:ln>
+            <a:noFill/>
+          </a:ln>
+        </p:spPr>
+        <p:txBody>
+          <a:bodyPr anchorCtr="0" anchor="t" bIns="91425" lIns="91425" spcFirstLastPara="1" rIns="91425" wrap="square" tIns="91425">
+            <a:noAutofit/>
+          </a:bodyPr>
+          <a:lstStyle/>
+          <a:p>
+            <a:pPr indent="0" lvl="0" marL="0" rtl="0" algn="l">
+              <a:spcBef>
+                <a:spcPts val="0"/>
+              </a:spcBef>
+              <a:spcAft>
+                <a:spcPts val="0"/>
+              </a:spcAft>
+              <a:buNone/>
+            </a:pPr>
+            <a:r>
+              <a:rPr b="1" lang="es" sz="2700">
+                <a:latin typeface="Proxima Nova"/>
+                <a:ea typeface="Proxima Nova"/>
+                <a:cs typeface="Proxima Nova"/>
+                <a:sym typeface="Proxima Nova"/>
+              </a:rPr>
+              <a:t>K Neighbors Regressor</a:t>
+            </a:r>
+            <a:endParaRPr b="1" sz="2700">
+              <a:latin typeface="Proxima Nova"/>
+              <a:ea typeface="Proxima Nova"/>
+              <a:cs typeface="Proxima Nova"/>
+              <a:sym typeface="Proxima Nova"/>
+            </a:endParaRPr>
+          </a:p>
+        </p:txBody>
+      </p:sp>
+      <p:sp>
+        <p:nvSpPr>
+          <p:cNvPr id="187" name="Google Shape;187;p31"/>
+          <p:cNvSpPr txBox="1"/>
+          <p:nvPr/>
+        </p:nvSpPr>
+        <p:spPr>
+          <a:xfrm>
+            <a:off x="377100" y="2536500"/>
+            <a:ext cx="3853800" cy="2337900"/>
+          </a:xfrm>
+          <a:prstGeom prst="rect">
+            <a:avLst/>
+          </a:prstGeom>
+          <a:noFill/>
+          <a:ln>
+            <a:noFill/>
+          </a:ln>
+        </p:spPr>
+        <p:txBody>
+          <a:bodyPr anchorCtr="0" anchor="t" bIns="91425" lIns="91425" spcFirstLastPara="1" rIns="91425" wrap="square" tIns="91425">
+            <a:noAutofit/>
+          </a:bodyPr>
+          <a:lstStyle/>
+          <a:p>
+            <a:pPr indent="0" lvl="0" marL="0" rtl="0" algn="ctr">
+              <a:lnSpc>
+                <a:spcPct val="150000"/>
+              </a:lnSpc>
+              <a:spcBef>
+                <a:spcPts val="0"/>
+              </a:spcBef>
+              <a:spcAft>
+                <a:spcPts val="0"/>
+              </a:spcAft>
+              <a:buNone/>
+            </a:pPr>
+            <a:r>
+              <a:rPr lang="es">
+                <a:latin typeface="Proxima Nova"/>
+                <a:ea typeface="Proxima Nova"/>
+                <a:cs typeface="Proxima Nova"/>
+                <a:sym typeface="Proxima Nova"/>
+              </a:rPr>
+              <a:t>El modelo de K vecinos devuelve un resultado menor al del árbol de decisión. El r2 es de 0.69 y el MAE de 46.693.</a:t>
+            </a:r>
+            <a:endParaRPr>
+              <a:latin typeface="Proxima Nova"/>
+              <a:ea typeface="Proxima Nova"/>
+              <a:cs typeface="Proxima Nova"/>
+              <a:sym typeface="Proxima Nova"/>
+            </a:endParaRPr>
+          </a:p>
+        </p:txBody>
+      </p:sp>
+      <p:pic>
+        <p:nvPicPr>
+          <p:cNvPr id="188" name="Google Shape;188;p31"/>
+          <p:cNvPicPr preferRelativeResize="0"/>
+          <p:nvPr/>
+        </p:nvPicPr>
+        <p:blipFill>
+          <a:blip r:embed="rId3">
+            <a:alphaModFix/>
+          </a:blip>
+          <a:stretch>
+            <a:fillRect/>
+          </a:stretch>
+        </p:blipFill>
+        <p:spPr>
+          <a:xfrm>
+            <a:off x="570450" y="1456938"/>
+            <a:ext cx="3467100" cy="476250"/>
+          </a:xfrm>
+          <a:prstGeom prst="rect">
+            <a:avLst/>
+          </a:prstGeom>
+          <a:noFill/>
+          <a:ln>
+            <a:noFill/>
+          </a:ln>
+        </p:spPr>
+      </p:pic>
+      <p:pic>
+        <p:nvPicPr>
+          <p:cNvPr id="189" name="Google Shape;189;p31"/>
+          <p:cNvPicPr preferRelativeResize="0"/>
+          <p:nvPr/>
+        </p:nvPicPr>
+        <p:blipFill>
+          <a:blip r:embed="rId4">
+            <a:alphaModFix/>
+          </a:blip>
+          <a:stretch>
+            <a:fillRect/>
+          </a:stretch>
+        </p:blipFill>
+        <p:spPr>
+          <a:xfrm>
+            <a:off x="5024275" y="2571749"/>
+            <a:ext cx="3311201" cy="2302650"/>
+          </a:xfrm>
+          <a:prstGeom prst="rect">
+            <a:avLst/>
+          </a:prstGeom>
+          <a:noFill/>
+          <a:ln>
+            <a:noFill/>
+          </a:ln>
+        </p:spPr>
+      </p:pic>
+      <p:pic>
+        <p:nvPicPr>
+          <p:cNvPr id="190" name="Google Shape;190;p31"/>
+          <p:cNvPicPr preferRelativeResize="0"/>
+          <p:nvPr/>
+        </p:nvPicPr>
+        <p:blipFill>
+          <a:blip r:embed="rId5">
+            <a:alphaModFix/>
+          </a:blip>
+          <a:stretch>
+            <a:fillRect/>
+          </a:stretch>
+        </p:blipFill>
+        <p:spPr>
+          <a:xfrm>
+            <a:off x="5024275" y="137325"/>
+            <a:ext cx="3311200" cy="2302650"/>
           </a:xfrm>
           <a:prstGeom prst="rect">
             <a:avLst/>
@@ -7996,175 +10027,6 @@
         </p:nvSpPr>
         <p:spPr>
           <a:xfrm>
-            <a:off x="311700" y="445025"/>
-            <a:ext cx="8520600" cy="572700"/>
-          </a:xfrm>
-          <a:prstGeom prst="rect">
-            <a:avLst/>
-          </a:prstGeom>
-        </p:spPr>
-        <p:txBody>
-          <a:bodyPr anchorCtr="0" anchor="t" bIns="91425" lIns="91425" spcFirstLastPara="1" rIns="91425" wrap="square" tIns="91425">
-            <a:normAutofit fontScale="90000"/>
-          </a:bodyPr>
-          <a:lstStyle/>
-          <a:p>
-            <a:pPr indent="0" lvl="0" marL="0" rtl="0" algn="l">
-              <a:spcBef>
-                <a:spcPts val="0"/>
-              </a:spcBef>
-              <a:spcAft>
-                <a:spcPts val="0"/>
-              </a:spcAft>
-              <a:buNone/>
-            </a:pPr>
-            <a:r>
-              <a:rPr lang="es">
-                <a:latin typeface="Proxima Nova Semibold"/>
-                <a:ea typeface="Proxima Nova Semibold"/>
-                <a:cs typeface="Proxima Nova Semibold"/>
-                <a:sym typeface="Proxima Nova Semibold"/>
-              </a:rPr>
-              <a:t>Glosario</a:t>
-            </a:r>
-            <a:endParaRPr>
-              <a:latin typeface="Proxima Nova Semibold"/>
-              <a:ea typeface="Proxima Nova Semibold"/>
-              <a:cs typeface="Proxima Nova Semibold"/>
-              <a:sym typeface="Proxima Nova Semibold"/>
-            </a:endParaRPr>
-          </a:p>
-        </p:txBody>
-      </p:sp>
-      <p:cxnSp>
-        <p:nvCxnSpPr>
-          <p:cNvPr id="67" name="Google Shape;67;p14"/>
-          <p:cNvCxnSpPr>
-            <a:endCxn id="68" idx="2"/>
-          </p:cNvCxnSpPr>
-          <p:nvPr/>
-        </p:nvCxnSpPr>
-        <p:spPr>
-          <a:xfrm>
-            <a:off x="1731725" y="2151375"/>
-            <a:ext cx="1240200" cy="627600"/>
-          </a:xfrm>
-          <a:prstGeom prst="straightConnector1">
-            <a:avLst/>
-          </a:prstGeom>
-          <a:noFill/>
-          <a:ln cap="flat" cmpd="sng" w="12700">
-            <a:solidFill>
-              <a:srgbClr val="00D703"/>
-            </a:solidFill>
-            <a:prstDash val="solid"/>
-            <a:miter lim="800000"/>
-            <a:headEnd len="sm" w="sm" type="none"/>
-            <a:tailEnd len="sm" w="sm" type="none"/>
-          </a:ln>
-        </p:spPr>
-      </p:cxnSp>
-      <p:sp>
-        <p:nvSpPr>
-          <p:cNvPr id="68" name="Google Shape;68;p14"/>
-          <p:cNvSpPr txBox="1"/>
-          <p:nvPr/>
-        </p:nvSpPr>
-        <p:spPr>
-          <a:xfrm>
-            <a:off x="663575" y="2127075"/>
-            <a:ext cx="4616700" cy="651900"/>
-          </a:xfrm>
-          <a:prstGeom prst="rect">
-            <a:avLst/>
-          </a:prstGeom>
-          <a:noFill/>
-          <a:ln>
-            <a:noFill/>
-          </a:ln>
-        </p:spPr>
-        <p:txBody>
-          <a:bodyPr anchorCtr="0" anchor="t" bIns="91425" lIns="91425" spcFirstLastPara="1" rIns="91425" wrap="square" tIns="91425">
-            <a:noAutofit/>
-          </a:bodyPr>
-          <a:lstStyle/>
-          <a:p>
-            <a:pPr indent="-425450" lvl="0" marL="914400" rtl="0" algn="l">
-              <a:spcBef>
-                <a:spcPts val="0"/>
-              </a:spcBef>
-              <a:spcAft>
-                <a:spcPts val="0"/>
-              </a:spcAft>
-              <a:buClr>
-                <a:srgbClr val="008EFF"/>
-              </a:buClr>
-              <a:buSzPts val="3100"/>
-              <a:buFont typeface="Anton"/>
-              <a:buAutoNum type="arabicPeriod"/>
-            </a:pPr>
-            <a:r>
-              <a:rPr lang="es" sz="1600">
-                <a:latin typeface="Proxima Nova Semibold"/>
-                <a:ea typeface="Proxima Nova Semibold"/>
-                <a:cs typeface="Proxima Nova Semibold"/>
-                <a:sym typeface="Proxima Nova Semibold"/>
-              </a:rPr>
-              <a:t>        </a:t>
-            </a:r>
-            <a:r>
-              <a:rPr lang="es" sz="2300">
-                <a:latin typeface="Proxima Nova"/>
-                <a:ea typeface="Proxima Nova"/>
-                <a:cs typeface="Proxima Nova"/>
-                <a:sym typeface="Proxima Nova"/>
-              </a:rPr>
-              <a:t>Contexto y Audiencia</a:t>
-            </a:r>
-            <a:endParaRPr sz="2300">
-              <a:latin typeface="Proxima Nova"/>
-              <a:ea typeface="Proxima Nova"/>
-              <a:cs typeface="Proxima Nova"/>
-              <a:sym typeface="Proxima Nova"/>
-            </a:endParaRPr>
-          </a:p>
-        </p:txBody>
-      </p:sp>
-    </p:spTree>
-  </p:cSld>
-  <p:clrMapOvr>
-    <a:masterClrMapping/>
-  </p:clrMapOvr>
-</p:sld>
-</file>
-
-<file path=ppt/slides/slide3.xml><?xml version="1.0" encoding="utf-8"?>
-<p:sld xmlns:a="http://schemas.openxmlformats.org/drawingml/2006/main" xmlns:r="http://schemas.openxmlformats.org/officeDocument/2006/relationships" xmlns:mc="http://schemas.openxmlformats.org/markup-compatibility/2006" xmlns:mv="urn:schemas-microsoft-com:mac:vml" xmlns:p="http://schemas.openxmlformats.org/presentationml/2006/main" xmlns:c="http://schemas.openxmlformats.org/drawingml/2006/chart" xmlns:dgm="http://schemas.openxmlformats.org/drawingml/2006/diagram" xmlns:o="urn:schemas-microsoft-com:office:office" xmlns:v="urn:schemas-microsoft-com:vml" xmlns:pvml="urn:schemas-microsoft-com:office:powerpoint" xmlns:com="http://schemas.openxmlformats.org/drawingml/2006/compatibility" xmlns:p14="http://schemas.microsoft.com/office/powerpoint/2010/main" xmlns:p15="http://schemas.microsoft.com/office/powerpoint/2012/main" xmlns:ahyp="http://schemas.microsoft.com/office/drawing/2018/hyperlinkcolor">
-  <p:cSld>
-    <p:spTree>
-      <p:nvGrpSpPr>
-        <p:cNvPr id="72" name="Shape 72"/>
-        <p:cNvGrpSpPr/>
-        <p:nvPr/>
-      </p:nvGrpSpPr>
-      <p:grpSpPr>
-        <a:xfrm>
-          <a:off x="0" y="0"/>
-          <a:ext cx="0" cy="0"/>
-          <a:chOff x="0" y="0"/>
-          <a:chExt cx="0" cy="0"/>
-        </a:xfrm>
-      </p:grpSpPr>
-      <p:sp>
-        <p:nvSpPr>
-          <p:cNvPr id="73" name="Google Shape;73;p15"/>
-          <p:cNvSpPr txBox="1"/>
-          <p:nvPr>
-            <p:ph type="title"/>
-          </p:nvPr>
-        </p:nvSpPr>
-        <p:spPr>
-          <a:xfrm>
             <a:off x="311700" y="51750"/>
             <a:ext cx="8520600" cy="572700"/>
           </a:xfrm>
@@ -8198,7 +10060,7 @@
       </p:sp>
       <p:sp>
         <p:nvSpPr>
-          <p:cNvPr id="74" name="Google Shape;74;p15"/>
+          <p:cNvPr id="67" name="Google Shape;67;p14"/>
           <p:cNvSpPr txBox="1"/>
           <p:nvPr>
             <p:ph idx="1" type="body"/>
@@ -8298,12 +10160,12 @@
 </p:sld>
 </file>
 
-<file path=ppt/slides/slide4.xml><?xml version="1.0" encoding="utf-8"?>
+<file path=ppt/slides/slide20.xml><?xml version="1.0" encoding="utf-8"?>
 <p:sld xmlns:a="http://schemas.openxmlformats.org/drawingml/2006/main" xmlns:r="http://schemas.openxmlformats.org/officeDocument/2006/relationships" xmlns:mc="http://schemas.openxmlformats.org/markup-compatibility/2006" xmlns:mv="urn:schemas-microsoft-com:mac:vml" xmlns:p="http://schemas.openxmlformats.org/presentationml/2006/main" xmlns:c="http://schemas.openxmlformats.org/drawingml/2006/chart" xmlns:dgm="http://schemas.openxmlformats.org/drawingml/2006/diagram" xmlns:o="urn:schemas-microsoft-com:office:office" xmlns:v="urn:schemas-microsoft-com:vml" xmlns:pvml="urn:schemas-microsoft-com:office:powerpoint" xmlns:com="http://schemas.openxmlformats.org/drawingml/2006/compatibility" xmlns:p14="http://schemas.microsoft.com/office/powerpoint/2010/main" xmlns:p15="http://schemas.microsoft.com/office/powerpoint/2012/main" xmlns:ahyp="http://schemas.microsoft.com/office/drawing/2018/hyperlinkcolor">
   <p:cSld>
     <p:spTree>
       <p:nvGrpSpPr>
-        <p:cNvPr id="78" name="Shape 78"/>
+        <p:cNvPr id="194" name="Shape 194"/>
         <p:cNvGrpSpPr/>
         <p:nvPr/>
       </p:nvGrpSpPr>
@@ -8317,7 +10179,1002 @@
       </p:grpSpPr>
       <p:sp>
         <p:nvSpPr>
-          <p:cNvPr id="79" name="Google Shape;79;p16"/>
+          <p:cNvPr id="195" name="Google Shape;195;p32"/>
+          <p:cNvSpPr txBox="1"/>
+          <p:nvPr/>
+        </p:nvSpPr>
+        <p:spPr>
+          <a:xfrm>
+            <a:off x="143300" y="284200"/>
+            <a:ext cx="4230900" cy="561900"/>
+          </a:xfrm>
+          <a:prstGeom prst="rect">
+            <a:avLst/>
+          </a:prstGeom>
+          <a:noFill/>
+          <a:ln>
+            <a:noFill/>
+          </a:ln>
+        </p:spPr>
+        <p:txBody>
+          <a:bodyPr anchorCtr="0" anchor="t" bIns="91425" lIns="91425" spcFirstLastPara="1" rIns="91425" wrap="square" tIns="91425">
+            <a:noAutofit/>
+          </a:bodyPr>
+          <a:lstStyle/>
+          <a:p>
+            <a:pPr indent="0" lvl="0" marL="0" rtl="0" algn="l">
+              <a:spcBef>
+                <a:spcPts val="0"/>
+              </a:spcBef>
+              <a:spcAft>
+                <a:spcPts val="0"/>
+              </a:spcAft>
+              <a:buNone/>
+            </a:pPr>
+            <a:r>
+              <a:rPr b="1" lang="es" sz="2700">
+                <a:latin typeface="Proxima Nova"/>
+                <a:ea typeface="Proxima Nova"/>
+                <a:cs typeface="Proxima Nova"/>
+                <a:sym typeface="Proxima Nova"/>
+              </a:rPr>
+              <a:t>Random Forest Regressor</a:t>
+            </a:r>
+            <a:endParaRPr b="1" sz="2700">
+              <a:latin typeface="Proxima Nova"/>
+              <a:ea typeface="Proxima Nova"/>
+              <a:cs typeface="Proxima Nova"/>
+              <a:sym typeface="Proxima Nova"/>
+            </a:endParaRPr>
+          </a:p>
+        </p:txBody>
+      </p:sp>
+      <p:sp>
+        <p:nvSpPr>
+          <p:cNvPr id="196" name="Google Shape;196;p32"/>
+          <p:cNvSpPr txBox="1"/>
+          <p:nvPr/>
+        </p:nvSpPr>
+        <p:spPr>
+          <a:xfrm>
+            <a:off x="384650" y="2756125"/>
+            <a:ext cx="3853800" cy="1651500"/>
+          </a:xfrm>
+          <a:prstGeom prst="rect">
+            <a:avLst/>
+          </a:prstGeom>
+          <a:noFill/>
+          <a:ln>
+            <a:noFill/>
+          </a:ln>
+        </p:spPr>
+        <p:txBody>
+          <a:bodyPr anchorCtr="0" anchor="t" bIns="91425" lIns="91425" spcFirstLastPara="1" rIns="91425" wrap="square" tIns="91425">
+            <a:noAutofit/>
+          </a:bodyPr>
+          <a:lstStyle/>
+          <a:p>
+            <a:pPr indent="0" lvl="0" marL="0" rtl="0" algn="ctr">
+              <a:lnSpc>
+                <a:spcPct val="150000"/>
+              </a:lnSpc>
+              <a:spcBef>
+                <a:spcPts val="0"/>
+              </a:spcBef>
+              <a:spcAft>
+                <a:spcPts val="0"/>
+              </a:spcAft>
+              <a:buNone/>
+            </a:pPr>
+            <a:r>
+              <a:rPr lang="es">
+                <a:latin typeface="Proxima Nova"/>
+                <a:ea typeface="Proxima Nova"/>
+                <a:cs typeface="Proxima Nova"/>
+                <a:sym typeface="Proxima Nova"/>
+              </a:rPr>
+              <a:t>El modelo de bosque aleatorio es el modelo más preciso hasta ahora con un r2 de 0.9 y un MAE de 25.535</a:t>
+            </a:r>
+            <a:endParaRPr>
+              <a:latin typeface="Proxima Nova"/>
+              <a:ea typeface="Proxima Nova"/>
+              <a:cs typeface="Proxima Nova"/>
+              <a:sym typeface="Proxima Nova"/>
+            </a:endParaRPr>
+          </a:p>
+        </p:txBody>
+      </p:sp>
+      <p:pic>
+        <p:nvPicPr>
+          <p:cNvPr id="197" name="Google Shape;197;p32"/>
+          <p:cNvPicPr preferRelativeResize="0"/>
+          <p:nvPr/>
+        </p:nvPicPr>
+        <p:blipFill>
+          <a:blip r:embed="rId3">
+            <a:alphaModFix/>
+          </a:blip>
+          <a:stretch>
+            <a:fillRect/>
+          </a:stretch>
+        </p:blipFill>
+        <p:spPr>
+          <a:xfrm>
+            <a:off x="134675" y="1548700"/>
+            <a:ext cx="4248150" cy="504825"/>
+          </a:xfrm>
+          <a:prstGeom prst="rect">
+            <a:avLst/>
+          </a:prstGeom>
+          <a:noFill/>
+          <a:ln>
+            <a:noFill/>
+          </a:ln>
+        </p:spPr>
+      </p:pic>
+      <p:pic>
+        <p:nvPicPr>
+          <p:cNvPr id="198" name="Google Shape;198;p32"/>
+          <p:cNvPicPr preferRelativeResize="0"/>
+          <p:nvPr/>
+        </p:nvPicPr>
+        <p:blipFill>
+          <a:blip r:embed="rId4">
+            <a:alphaModFix/>
+          </a:blip>
+          <a:stretch>
+            <a:fillRect/>
+          </a:stretch>
+        </p:blipFill>
+        <p:spPr>
+          <a:xfrm>
+            <a:off x="5010025" y="2756125"/>
+            <a:ext cx="3346275" cy="2148500"/>
+          </a:xfrm>
+          <a:prstGeom prst="rect">
+            <a:avLst/>
+          </a:prstGeom>
+          <a:noFill/>
+          <a:ln>
+            <a:noFill/>
+          </a:ln>
+        </p:spPr>
+      </p:pic>
+      <p:pic>
+        <p:nvPicPr>
+          <p:cNvPr id="199" name="Google Shape;199;p32"/>
+          <p:cNvPicPr preferRelativeResize="0"/>
+          <p:nvPr/>
+        </p:nvPicPr>
+        <p:blipFill>
+          <a:blip r:embed="rId5">
+            <a:alphaModFix/>
+          </a:blip>
+          <a:stretch>
+            <a:fillRect/>
+          </a:stretch>
+        </p:blipFill>
+        <p:spPr>
+          <a:xfrm>
+            <a:off x="5010025" y="144850"/>
+            <a:ext cx="3346275" cy="2368625"/>
+          </a:xfrm>
+          <a:prstGeom prst="rect">
+            <a:avLst/>
+          </a:prstGeom>
+          <a:noFill/>
+          <a:ln>
+            <a:noFill/>
+          </a:ln>
+        </p:spPr>
+      </p:pic>
+    </p:spTree>
+  </p:cSld>
+  <p:clrMapOvr>
+    <a:masterClrMapping/>
+  </p:clrMapOvr>
+</p:sld>
+</file>
+
+<file path=ppt/slides/slide21.xml><?xml version="1.0" encoding="utf-8"?>
+<p:sld xmlns:a="http://schemas.openxmlformats.org/drawingml/2006/main" xmlns:r="http://schemas.openxmlformats.org/officeDocument/2006/relationships" xmlns:mc="http://schemas.openxmlformats.org/markup-compatibility/2006" xmlns:mv="urn:schemas-microsoft-com:mac:vml" xmlns:p="http://schemas.openxmlformats.org/presentationml/2006/main" xmlns:c="http://schemas.openxmlformats.org/drawingml/2006/chart" xmlns:dgm="http://schemas.openxmlformats.org/drawingml/2006/diagram" xmlns:o="urn:schemas-microsoft-com:office:office" xmlns:v="urn:schemas-microsoft-com:vml" xmlns:pvml="urn:schemas-microsoft-com:office:powerpoint" xmlns:com="http://schemas.openxmlformats.org/drawingml/2006/compatibility" xmlns:p14="http://schemas.microsoft.com/office/powerpoint/2010/main" xmlns:p15="http://schemas.microsoft.com/office/powerpoint/2012/main" xmlns:ahyp="http://schemas.microsoft.com/office/drawing/2018/hyperlinkcolor">
+  <p:cSld>
+    <p:spTree>
+      <p:nvGrpSpPr>
+        <p:cNvPr id="203" name="Shape 203"/>
+        <p:cNvGrpSpPr/>
+        <p:nvPr/>
+      </p:nvGrpSpPr>
+      <p:grpSpPr>
+        <a:xfrm>
+          <a:off x="0" y="0"/>
+          <a:ext cx="0" cy="0"/>
+          <a:chOff x="0" y="0"/>
+          <a:chExt cx="0" cy="0"/>
+        </a:xfrm>
+      </p:grpSpPr>
+      <p:sp>
+        <p:nvSpPr>
+          <p:cNvPr id="204" name="Google Shape;204;p33"/>
+          <p:cNvSpPr txBox="1"/>
+          <p:nvPr/>
+        </p:nvSpPr>
+        <p:spPr>
+          <a:xfrm>
+            <a:off x="682500" y="303225"/>
+            <a:ext cx="3243000" cy="561900"/>
+          </a:xfrm>
+          <a:prstGeom prst="rect">
+            <a:avLst/>
+          </a:prstGeom>
+          <a:noFill/>
+          <a:ln>
+            <a:noFill/>
+          </a:ln>
+        </p:spPr>
+        <p:txBody>
+          <a:bodyPr anchorCtr="0" anchor="t" bIns="91425" lIns="91425" spcFirstLastPara="1" rIns="91425" wrap="square" tIns="91425">
+            <a:noAutofit/>
+          </a:bodyPr>
+          <a:lstStyle/>
+          <a:p>
+            <a:pPr indent="0" lvl="0" marL="0" rtl="0" algn="l">
+              <a:spcBef>
+                <a:spcPts val="0"/>
+              </a:spcBef>
+              <a:spcAft>
+                <a:spcPts val="0"/>
+              </a:spcAft>
+              <a:buNone/>
+            </a:pPr>
+            <a:r>
+              <a:rPr b="1" lang="es" sz="2700">
+                <a:latin typeface="Proxima Nova"/>
+                <a:ea typeface="Proxima Nova"/>
+                <a:cs typeface="Proxima Nova"/>
+                <a:sym typeface="Proxima Nova"/>
+              </a:rPr>
+              <a:t>XGBoost Regressor</a:t>
+            </a:r>
+            <a:endParaRPr b="1" sz="2700">
+              <a:latin typeface="Proxima Nova"/>
+              <a:ea typeface="Proxima Nova"/>
+              <a:cs typeface="Proxima Nova"/>
+              <a:sym typeface="Proxima Nova"/>
+            </a:endParaRPr>
+          </a:p>
+        </p:txBody>
+      </p:sp>
+      <p:sp>
+        <p:nvSpPr>
+          <p:cNvPr id="205" name="Google Shape;205;p33"/>
+          <p:cNvSpPr txBox="1"/>
+          <p:nvPr/>
+        </p:nvSpPr>
+        <p:spPr>
+          <a:xfrm>
+            <a:off x="377100" y="2481275"/>
+            <a:ext cx="3853800" cy="2337900"/>
+          </a:xfrm>
+          <a:prstGeom prst="rect">
+            <a:avLst/>
+          </a:prstGeom>
+          <a:noFill/>
+          <a:ln>
+            <a:noFill/>
+          </a:ln>
+        </p:spPr>
+        <p:txBody>
+          <a:bodyPr anchorCtr="0" anchor="t" bIns="91425" lIns="91425" spcFirstLastPara="1" rIns="91425" wrap="square" tIns="91425">
+            <a:noAutofit/>
+          </a:bodyPr>
+          <a:lstStyle/>
+          <a:p>
+            <a:pPr indent="0" lvl="0" marL="0" rtl="0" algn="ctr">
+              <a:lnSpc>
+                <a:spcPct val="150000"/>
+              </a:lnSpc>
+              <a:spcBef>
+                <a:spcPts val="0"/>
+              </a:spcBef>
+              <a:spcAft>
+                <a:spcPts val="0"/>
+              </a:spcAft>
+              <a:buNone/>
+            </a:pPr>
+            <a:r>
+              <a:rPr lang="es">
+                <a:latin typeface="Proxima Nova"/>
+                <a:ea typeface="Proxima Nova"/>
+                <a:cs typeface="Proxima Nova"/>
+                <a:sym typeface="Proxima Nova"/>
+              </a:rPr>
+              <a:t>El algoritmo XGBoost arroja los mismos resultados que el Random Forest Regressor.</a:t>
+            </a:r>
+            <a:endParaRPr>
+              <a:latin typeface="Proxima Nova"/>
+              <a:ea typeface="Proxima Nova"/>
+              <a:cs typeface="Proxima Nova"/>
+              <a:sym typeface="Proxima Nova"/>
+            </a:endParaRPr>
+          </a:p>
+          <a:p>
+            <a:pPr indent="0" lvl="0" marL="0" rtl="0" algn="ctr">
+              <a:lnSpc>
+                <a:spcPct val="150000"/>
+              </a:lnSpc>
+              <a:spcBef>
+                <a:spcPts val="0"/>
+              </a:spcBef>
+              <a:spcAft>
+                <a:spcPts val="0"/>
+              </a:spcAft>
+              <a:buNone/>
+            </a:pPr>
+            <a:r>
+              <a:t/>
+            </a:r>
+            <a:endParaRPr>
+              <a:latin typeface="Proxima Nova"/>
+              <a:ea typeface="Proxima Nova"/>
+              <a:cs typeface="Proxima Nova"/>
+              <a:sym typeface="Proxima Nova"/>
+            </a:endParaRPr>
+          </a:p>
+          <a:p>
+            <a:pPr indent="0" lvl="0" marL="0" rtl="0" algn="ctr">
+              <a:lnSpc>
+                <a:spcPct val="150000"/>
+              </a:lnSpc>
+              <a:spcBef>
+                <a:spcPts val="0"/>
+              </a:spcBef>
+              <a:spcAft>
+                <a:spcPts val="0"/>
+              </a:spcAft>
+              <a:buNone/>
+            </a:pPr>
+            <a:r>
+              <a:rPr lang="es">
+                <a:latin typeface="Proxima Nova"/>
+                <a:ea typeface="Proxima Nova"/>
+                <a:cs typeface="Proxima Nova"/>
+                <a:sym typeface="Proxima Nova"/>
+              </a:rPr>
+              <a:t>Para la elección del algoritmo, se evaluan con gridsearch y cross validation</a:t>
+            </a:r>
+            <a:endParaRPr>
+              <a:latin typeface="Proxima Nova"/>
+              <a:ea typeface="Proxima Nova"/>
+              <a:cs typeface="Proxima Nova"/>
+              <a:sym typeface="Proxima Nova"/>
+            </a:endParaRPr>
+          </a:p>
+        </p:txBody>
+      </p:sp>
+      <p:pic>
+        <p:nvPicPr>
+          <p:cNvPr id="206" name="Google Shape;206;p33"/>
+          <p:cNvPicPr preferRelativeResize="0"/>
+          <p:nvPr/>
+        </p:nvPicPr>
+        <p:blipFill>
+          <a:blip r:embed="rId3">
+            <a:alphaModFix/>
+          </a:blip>
+          <a:stretch>
+            <a:fillRect/>
+          </a:stretch>
+        </p:blipFill>
+        <p:spPr>
+          <a:xfrm>
+            <a:off x="5010025" y="2756125"/>
+            <a:ext cx="3346275" cy="2148500"/>
+          </a:xfrm>
+          <a:prstGeom prst="rect">
+            <a:avLst/>
+          </a:prstGeom>
+          <a:noFill/>
+          <a:ln>
+            <a:noFill/>
+          </a:ln>
+        </p:spPr>
+      </p:pic>
+      <p:pic>
+        <p:nvPicPr>
+          <p:cNvPr id="207" name="Google Shape;207;p33"/>
+          <p:cNvPicPr preferRelativeResize="0"/>
+          <p:nvPr/>
+        </p:nvPicPr>
+        <p:blipFill>
+          <a:blip r:embed="rId4">
+            <a:alphaModFix/>
+          </a:blip>
+          <a:stretch>
+            <a:fillRect/>
+          </a:stretch>
+        </p:blipFill>
+        <p:spPr>
+          <a:xfrm>
+            <a:off x="5010025" y="144850"/>
+            <a:ext cx="3346275" cy="2368625"/>
+          </a:xfrm>
+          <a:prstGeom prst="rect">
+            <a:avLst/>
+          </a:prstGeom>
+          <a:noFill/>
+          <a:ln>
+            <a:noFill/>
+          </a:ln>
+        </p:spPr>
+      </p:pic>
+      <p:pic>
+        <p:nvPicPr>
+          <p:cNvPr id="208" name="Google Shape;208;p33"/>
+          <p:cNvPicPr preferRelativeResize="0"/>
+          <p:nvPr/>
+        </p:nvPicPr>
+        <p:blipFill>
+          <a:blip r:embed="rId5">
+            <a:alphaModFix/>
+          </a:blip>
+          <a:stretch>
+            <a:fillRect/>
+          </a:stretch>
+        </p:blipFill>
+        <p:spPr>
+          <a:xfrm>
+            <a:off x="665700" y="1454125"/>
+            <a:ext cx="3276600" cy="438150"/>
+          </a:xfrm>
+          <a:prstGeom prst="rect">
+            <a:avLst/>
+          </a:prstGeom>
+          <a:noFill/>
+          <a:ln>
+            <a:noFill/>
+          </a:ln>
+        </p:spPr>
+      </p:pic>
+    </p:spTree>
+  </p:cSld>
+  <p:clrMapOvr>
+    <a:masterClrMapping/>
+  </p:clrMapOvr>
+</p:sld>
+</file>
+
+<file path=ppt/slides/slide22.xml><?xml version="1.0" encoding="utf-8"?>
+<p:sld xmlns:a="http://schemas.openxmlformats.org/drawingml/2006/main" xmlns:r="http://schemas.openxmlformats.org/officeDocument/2006/relationships" xmlns:mc="http://schemas.openxmlformats.org/markup-compatibility/2006" xmlns:mv="urn:schemas-microsoft-com:mac:vml" xmlns:p="http://schemas.openxmlformats.org/presentationml/2006/main" xmlns:c="http://schemas.openxmlformats.org/drawingml/2006/chart" xmlns:dgm="http://schemas.openxmlformats.org/drawingml/2006/diagram" xmlns:o="urn:schemas-microsoft-com:office:office" xmlns:v="urn:schemas-microsoft-com:vml" xmlns:pvml="urn:schemas-microsoft-com:office:powerpoint" xmlns:com="http://schemas.openxmlformats.org/drawingml/2006/compatibility" xmlns:p14="http://schemas.microsoft.com/office/powerpoint/2010/main" xmlns:p15="http://schemas.microsoft.com/office/powerpoint/2012/main" xmlns:ahyp="http://schemas.microsoft.com/office/drawing/2018/hyperlinkcolor">
+  <p:cSld>
+    <p:spTree>
+      <p:nvGrpSpPr>
+        <p:cNvPr id="212" name="Shape 212"/>
+        <p:cNvGrpSpPr/>
+        <p:nvPr/>
+      </p:nvGrpSpPr>
+      <p:grpSpPr>
+        <a:xfrm>
+          <a:off x="0" y="0"/>
+          <a:ext cx="0" cy="0"/>
+          <a:chOff x="0" y="0"/>
+          <a:chExt cx="0" cy="0"/>
+        </a:xfrm>
+      </p:grpSpPr>
+      <p:pic>
+        <p:nvPicPr>
+          <p:cNvPr id="213" name="Google Shape;213;p34"/>
+          <p:cNvPicPr preferRelativeResize="0"/>
+          <p:nvPr/>
+        </p:nvPicPr>
+        <p:blipFill>
+          <a:blip r:embed="rId3">
+            <a:alphaModFix/>
+          </a:blip>
+          <a:stretch>
+            <a:fillRect/>
+          </a:stretch>
+        </p:blipFill>
+        <p:spPr>
+          <a:xfrm>
+            <a:off x="226925" y="1263663"/>
+            <a:ext cx="4191000" cy="1619250"/>
+          </a:xfrm>
+          <a:prstGeom prst="rect">
+            <a:avLst/>
+          </a:prstGeom>
+          <a:noFill/>
+          <a:ln>
+            <a:noFill/>
+          </a:ln>
+        </p:spPr>
+      </p:pic>
+      <p:pic>
+        <p:nvPicPr>
+          <p:cNvPr id="214" name="Google Shape;214;p34"/>
+          <p:cNvPicPr preferRelativeResize="0"/>
+          <p:nvPr/>
+        </p:nvPicPr>
+        <p:blipFill rotWithShape="1">
+          <a:blip r:embed="rId4">
+            <a:alphaModFix/>
+          </a:blip>
+          <a:srcRect b="4580" l="0" r="0" t="0"/>
+          <a:stretch/>
+        </p:blipFill>
+        <p:spPr>
+          <a:xfrm>
+            <a:off x="4805275" y="2941300"/>
+            <a:ext cx="3997150" cy="2042275"/>
+          </a:xfrm>
+          <a:prstGeom prst="rect">
+            <a:avLst/>
+          </a:prstGeom>
+          <a:noFill/>
+          <a:ln>
+            <a:noFill/>
+          </a:ln>
+        </p:spPr>
+      </p:pic>
+      <p:pic>
+        <p:nvPicPr>
+          <p:cNvPr id="215" name="Google Shape;215;p34"/>
+          <p:cNvPicPr preferRelativeResize="0"/>
+          <p:nvPr/>
+        </p:nvPicPr>
+        <p:blipFill rotWithShape="1">
+          <a:blip r:embed="rId5">
+            <a:alphaModFix/>
+          </a:blip>
+          <a:srcRect b="5195" l="0" r="0" t="0"/>
+          <a:stretch/>
+        </p:blipFill>
+        <p:spPr>
+          <a:xfrm>
+            <a:off x="4835850" y="638900"/>
+            <a:ext cx="3936025" cy="1857425"/>
+          </a:xfrm>
+          <a:prstGeom prst="rect">
+            <a:avLst/>
+          </a:prstGeom>
+          <a:noFill/>
+          <a:ln>
+            <a:noFill/>
+          </a:ln>
+        </p:spPr>
+      </p:pic>
+      <p:sp>
+        <p:nvSpPr>
+          <p:cNvPr id="216" name="Google Shape;216;p34"/>
+          <p:cNvSpPr txBox="1"/>
+          <p:nvPr/>
+        </p:nvSpPr>
+        <p:spPr>
+          <a:xfrm>
+            <a:off x="1332575" y="258000"/>
+            <a:ext cx="1979700" cy="561900"/>
+          </a:xfrm>
+          <a:prstGeom prst="rect">
+            <a:avLst/>
+          </a:prstGeom>
+          <a:noFill/>
+          <a:ln>
+            <a:noFill/>
+          </a:ln>
+        </p:spPr>
+        <p:txBody>
+          <a:bodyPr anchorCtr="0" anchor="t" bIns="91425" lIns="91425" spcFirstLastPara="1" rIns="91425" wrap="square" tIns="91425">
+            <a:noAutofit/>
+          </a:bodyPr>
+          <a:lstStyle/>
+          <a:p>
+            <a:pPr indent="0" lvl="0" marL="0" rtl="0" algn="l">
+              <a:spcBef>
+                <a:spcPts val="0"/>
+              </a:spcBef>
+              <a:spcAft>
+                <a:spcPts val="0"/>
+              </a:spcAft>
+              <a:buNone/>
+            </a:pPr>
+            <a:r>
+              <a:rPr b="1" lang="es" sz="2700">
+                <a:latin typeface="Proxima Nova"/>
+                <a:ea typeface="Proxima Nova"/>
+                <a:cs typeface="Proxima Nova"/>
+                <a:sym typeface="Proxima Nova"/>
+              </a:rPr>
+              <a:t>Resultados</a:t>
+            </a:r>
+            <a:endParaRPr b="1" sz="2700">
+              <a:latin typeface="Proxima Nova"/>
+              <a:ea typeface="Proxima Nova"/>
+              <a:cs typeface="Proxima Nova"/>
+              <a:sym typeface="Proxima Nova"/>
+            </a:endParaRPr>
+          </a:p>
+        </p:txBody>
+      </p:sp>
+      <p:sp>
+        <p:nvSpPr>
+          <p:cNvPr id="217" name="Google Shape;217;p34"/>
+          <p:cNvSpPr txBox="1"/>
+          <p:nvPr/>
+        </p:nvSpPr>
+        <p:spPr>
+          <a:xfrm>
+            <a:off x="6539850" y="2554713"/>
+            <a:ext cx="528000" cy="328200"/>
+          </a:xfrm>
+          <a:prstGeom prst="rect">
+            <a:avLst/>
+          </a:prstGeom>
+          <a:noFill/>
+          <a:ln>
+            <a:noFill/>
+          </a:ln>
+        </p:spPr>
+        <p:txBody>
+          <a:bodyPr anchorCtr="0" anchor="t" bIns="91425" lIns="91425" spcFirstLastPara="1" rIns="91425" wrap="square" tIns="91425">
+            <a:noAutofit/>
+          </a:bodyPr>
+          <a:lstStyle/>
+          <a:p>
+            <a:pPr indent="0" lvl="0" marL="0" rtl="0" algn="ctr">
+              <a:spcBef>
+                <a:spcPts val="0"/>
+              </a:spcBef>
+              <a:spcAft>
+                <a:spcPts val="0"/>
+              </a:spcAft>
+              <a:buNone/>
+            </a:pPr>
+            <a:r>
+              <a:rPr b="1" lang="es">
+                <a:solidFill>
+                  <a:schemeClr val="lt1"/>
+                </a:solidFill>
+                <a:latin typeface="Proxima Nova"/>
+                <a:ea typeface="Proxima Nova"/>
+                <a:cs typeface="Proxima Nova"/>
+                <a:sym typeface="Proxima Nova"/>
+              </a:rPr>
+              <a:t>R2</a:t>
+            </a:r>
+            <a:endParaRPr b="1">
+              <a:solidFill>
+                <a:schemeClr val="lt1"/>
+              </a:solidFill>
+              <a:latin typeface="Proxima Nova"/>
+              <a:ea typeface="Proxima Nova"/>
+              <a:cs typeface="Proxima Nova"/>
+              <a:sym typeface="Proxima Nova"/>
+            </a:endParaRPr>
+          </a:p>
+        </p:txBody>
+      </p:sp>
+      <p:sp>
+        <p:nvSpPr>
+          <p:cNvPr id="218" name="Google Shape;218;p34"/>
+          <p:cNvSpPr txBox="1"/>
+          <p:nvPr/>
+        </p:nvSpPr>
+        <p:spPr>
+          <a:xfrm>
+            <a:off x="6458266" y="193838"/>
+            <a:ext cx="691200" cy="328200"/>
+          </a:xfrm>
+          <a:prstGeom prst="rect">
+            <a:avLst/>
+          </a:prstGeom>
+          <a:noFill/>
+          <a:ln>
+            <a:noFill/>
+          </a:ln>
+        </p:spPr>
+        <p:txBody>
+          <a:bodyPr anchorCtr="0" anchor="t" bIns="91425" lIns="91425" spcFirstLastPara="1" rIns="91425" wrap="square" tIns="91425">
+            <a:noAutofit/>
+          </a:bodyPr>
+          <a:lstStyle/>
+          <a:p>
+            <a:pPr indent="0" lvl="0" marL="0" rtl="0" algn="ctr">
+              <a:spcBef>
+                <a:spcPts val="0"/>
+              </a:spcBef>
+              <a:spcAft>
+                <a:spcPts val="0"/>
+              </a:spcAft>
+              <a:buNone/>
+            </a:pPr>
+            <a:r>
+              <a:rPr b="1" lang="es">
+                <a:solidFill>
+                  <a:schemeClr val="lt1"/>
+                </a:solidFill>
+                <a:latin typeface="Proxima Nova"/>
+                <a:ea typeface="Proxima Nova"/>
+                <a:cs typeface="Proxima Nova"/>
+                <a:sym typeface="Proxima Nova"/>
+              </a:rPr>
+              <a:t>MAE</a:t>
+            </a:r>
+            <a:endParaRPr b="1">
+              <a:solidFill>
+                <a:schemeClr val="lt1"/>
+              </a:solidFill>
+              <a:latin typeface="Proxima Nova"/>
+              <a:ea typeface="Proxima Nova"/>
+              <a:cs typeface="Proxima Nova"/>
+              <a:sym typeface="Proxima Nova"/>
+            </a:endParaRPr>
+          </a:p>
+        </p:txBody>
+      </p:sp>
+      <p:sp>
+        <p:nvSpPr>
+          <p:cNvPr id="219" name="Google Shape;219;p34"/>
+          <p:cNvSpPr txBox="1"/>
+          <p:nvPr/>
+        </p:nvSpPr>
+        <p:spPr>
+          <a:xfrm>
+            <a:off x="406775" y="3326700"/>
+            <a:ext cx="3831300" cy="1530900"/>
+          </a:xfrm>
+          <a:prstGeom prst="rect">
+            <a:avLst/>
+          </a:prstGeom>
+          <a:noFill/>
+          <a:ln>
+            <a:noFill/>
+          </a:ln>
+        </p:spPr>
+        <p:txBody>
+          <a:bodyPr anchorCtr="0" anchor="t" bIns="91425" lIns="91425" spcFirstLastPara="1" rIns="91425" wrap="square" tIns="91425">
+            <a:noAutofit/>
+          </a:bodyPr>
+          <a:lstStyle/>
+          <a:p>
+            <a:pPr indent="0" lvl="0" marL="0" rtl="0" algn="ctr">
+              <a:lnSpc>
+                <a:spcPct val="150000"/>
+              </a:lnSpc>
+              <a:spcBef>
+                <a:spcPts val="0"/>
+              </a:spcBef>
+              <a:spcAft>
+                <a:spcPts val="0"/>
+              </a:spcAft>
+              <a:buNone/>
+            </a:pPr>
+            <a:r>
+              <a:rPr lang="es">
+                <a:latin typeface="Proxima Nova"/>
+                <a:ea typeface="Proxima Nova"/>
+                <a:cs typeface="Proxima Nova"/>
+                <a:sym typeface="Proxima Nova"/>
+              </a:rPr>
+              <a:t>Se concluye que el modelo que mejor explica los precios de los inmuebles es el XGBoost</a:t>
+            </a:r>
+            <a:endParaRPr>
+              <a:latin typeface="Proxima Nova"/>
+              <a:ea typeface="Proxima Nova"/>
+              <a:cs typeface="Proxima Nova"/>
+              <a:sym typeface="Proxima Nova"/>
+            </a:endParaRPr>
+          </a:p>
+        </p:txBody>
+      </p:sp>
+    </p:spTree>
+  </p:cSld>
+  <p:clrMapOvr>
+    <a:masterClrMapping/>
+  </p:clrMapOvr>
+</p:sld>
+</file>
+
+<file path=ppt/slides/slide23.xml><?xml version="1.0" encoding="utf-8"?>
+<p:sld xmlns:a="http://schemas.openxmlformats.org/drawingml/2006/main" xmlns:r="http://schemas.openxmlformats.org/officeDocument/2006/relationships" xmlns:mc="http://schemas.openxmlformats.org/markup-compatibility/2006" xmlns:mv="urn:schemas-microsoft-com:mac:vml" xmlns:p="http://schemas.openxmlformats.org/presentationml/2006/main" xmlns:c="http://schemas.openxmlformats.org/drawingml/2006/chart" xmlns:dgm="http://schemas.openxmlformats.org/drawingml/2006/diagram" xmlns:o="urn:schemas-microsoft-com:office:office" xmlns:v="urn:schemas-microsoft-com:vml" xmlns:pvml="urn:schemas-microsoft-com:office:powerpoint" xmlns:com="http://schemas.openxmlformats.org/drawingml/2006/compatibility" xmlns:p14="http://schemas.microsoft.com/office/powerpoint/2010/main" xmlns:p15="http://schemas.microsoft.com/office/powerpoint/2012/main" xmlns:ahyp="http://schemas.microsoft.com/office/drawing/2018/hyperlinkcolor">
+  <p:cSld>
+    <p:spTree>
+      <p:nvGrpSpPr>
+        <p:cNvPr id="223" name="Shape 223"/>
+        <p:cNvGrpSpPr/>
+        <p:nvPr/>
+      </p:nvGrpSpPr>
+      <p:grpSpPr>
+        <a:xfrm>
+          <a:off x="0" y="0"/>
+          <a:ext cx="0" cy="0"/>
+          <a:chOff x="0" y="0"/>
+          <a:chExt cx="0" cy="0"/>
+        </a:xfrm>
+      </p:grpSpPr>
+      <p:sp>
+        <p:nvSpPr>
+          <p:cNvPr id="224" name="Google Shape;224;p35"/>
+          <p:cNvSpPr txBox="1"/>
+          <p:nvPr>
+            <p:ph type="title"/>
+          </p:nvPr>
+        </p:nvSpPr>
+        <p:spPr>
+          <a:xfrm>
+            <a:off x="580725" y="277475"/>
+            <a:ext cx="3182700" cy="816000"/>
+          </a:xfrm>
+          <a:prstGeom prst="rect">
+            <a:avLst/>
+          </a:prstGeom>
+        </p:spPr>
+        <p:txBody>
+          <a:bodyPr anchorCtr="0" anchor="ctr" bIns="91425" lIns="91425" spcFirstLastPara="1" rIns="91425" wrap="square" tIns="91425">
+            <a:normAutofit fontScale="90000"/>
+          </a:bodyPr>
+          <a:lstStyle/>
+          <a:p>
+            <a:pPr indent="0" lvl="0" marL="0" rtl="0" algn="l">
+              <a:spcBef>
+                <a:spcPts val="0"/>
+              </a:spcBef>
+              <a:spcAft>
+                <a:spcPts val="0"/>
+              </a:spcAft>
+              <a:buNone/>
+            </a:pPr>
+            <a:r>
+              <a:rPr b="1" lang="es"/>
+              <a:t>Conclusión</a:t>
+            </a:r>
+            <a:endParaRPr b="1"/>
+          </a:p>
+        </p:txBody>
+      </p:sp>
+      <p:sp>
+        <p:nvSpPr>
+          <p:cNvPr id="225" name="Google Shape;225;p35"/>
+          <p:cNvSpPr txBox="1"/>
+          <p:nvPr/>
+        </p:nvSpPr>
+        <p:spPr>
+          <a:xfrm>
+            <a:off x="1111800" y="1201950"/>
+            <a:ext cx="6445200" cy="1046700"/>
+          </a:xfrm>
+          <a:prstGeom prst="rect">
+            <a:avLst/>
+          </a:prstGeom>
+          <a:noFill/>
+          <a:ln>
+            <a:noFill/>
+          </a:ln>
+        </p:spPr>
+        <p:txBody>
+          <a:bodyPr anchorCtr="0" anchor="t" bIns="91425" lIns="91425" spcFirstLastPara="1" rIns="91425" wrap="square" tIns="91425">
+            <a:spAutoFit/>
+          </a:bodyPr>
+          <a:lstStyle/>
+          <a:p>
+            <a:pPr indent="-317500" lvl="0" marL="457200" rtl="0" algn="l">
+              <a:lnSpc>
+                <a:spcPct val="150000"/>
+              </a:lnSpc>
+              <a:spcBef>
+                <a:spcPts val="0"/>
+              </a:spcBef>
+              <a:spcAft>
+                <a:spcPts val="0"/>
+              </a:spcAft>
+              <a:buClr>
+                <a:schemeClr val="dk1"/>
+              </a:buClr>
+              <a:buSzPts val="1400"/>
+              <a:buFont typeface="Proxima Nova"/>
+              <a:buChar char="●"/>
+            </a:pPr>
+            <a:r>
+              <a:rPr lang="es">
+                <a:solidFill>
+                  <a:schemeClr val="dk1"/>
+                </a:solidFill>
+                <a:latin typeface="Proxima Nova"/>
+                <a:ea typeface="Proxima Nova"/>
+                <a:cs typeface="Proxima Nova"/>
+                <a:sym typeface="Proxima Nova"/>
+              </a:rPr>
+              <a:t>Se puede concluir que entre las múltiples variables analizadas, tanto la superficie del inmueble como su ubicación se destacan como factores especialmente influyentes en la determinación del precio de la propiedad</a:t>
+            </a:r>
+            <a:endParaRPr/>
+          </a:p>
+        </p:txBody>
+      </p:sp>
+      <p:sp>
+        <p:nvSpPr>
+          <p:cNvPr id="226" name="Google Shape;226;p35"/>
+          <p:cNvSpPr txBox="1"/>
+          <p:nvPr/>
+        </p:nvSpPr>
+        <p:spPr>
+          <a:xfrm>
+            <a:off x="1111800" y="2571750"/>
+            <a:ext cx="6445200" cy="2016300"/>
+          </a:xfrm>
+          <a:prstGeom prst="rect">
+            <a:avLst/>
+          </a:prstGeom>
+          <a:noFill/>
+          <a:ln>
+            <a:noFill/>
+          </a:ln>
+        </p:spPr>
+        <p:txBody>
+          <a:bodyPr anchorCtr="0" anchor="t" bIns="91425" lIns="91425" spcFirstLastPara="1" rIns="91425" wrap="square" tIns="91425">
+            <a:spAutoFit/>
+          </a:bodyPr>
+          <a:lstStyle/>
+          <a:p>
+            <a:pPr indent="-317500" lvl="0" marL="457200" rtl="0" algn="l">
+              <a:lnSpc>
+                <a:spcPct val="150000"/>
+              </a:lnSpc>
+              <a:spcBef>
+                <a:spcPts val="0"/>
+              </a:spcBef>
+              <a:spcAft>
+                <a:spcPts val="0"/>
+              </a:spcAft>
+              <a:buClr>
+                <a:schemeClr val="dk1"/>
+              </a:buClr>
+              <a:buSzPts val="1400"/>
+              <a:buFont typeface="Proxima Nova"/>
+              <a:buChar char="●"/>
+            </a:pPr>
+            <a:r>
+              <a:rPr lang="es">
+                <a:solidFill>
+                  <a:schemeClr val="dk1"/>
+                </a:solidFill>
+                <a:latin typeface="Proxima Nova"/>
+                <a:ea typeface="Proxima Nova"/>
+                <a:cs typeface="Proxima Nova"/>
+                <a:sym typeface="Proxima Nova"/>
+              </a:rPr>
+              <a:t>La ubicación del inmueble se revela como un factor de gran relevancia en la determinación de su precio. A pesar de que las casas tienden a ostentar valores más elevados en comparación con otros tipos de propiedades, esta diferencia suele estar correlacionada con una mayor superficie. Esto sugiere que la dimensión de la propiedad ejerce una influencia más acentuada en su valor que el tipo de propiedad en sí</a:t>
+            </a:r>
+            <a:endParaRPr/>
+          </a:p>
+        </p:txBody>
+      </p:sp>
+    </p:spTree>
+  </p:cSld>
+  <p:clrMapOvr>
+    <a:masterClrMapping/>
+  </p:clrMapOvr>
+</p:sld>
+</file>
+
+<file path=ppt/slides/slide3.xml><?xml version="1.0" encoding="utf-8"?>
+<p:sld xmlns:a="http://schemas.openxmlformats.org/drawingml/2006/main" xmlns:r="http://schemas.openxmlformats.org/officeDocument/2006/relationships" xmlns:mc="http://schemas.openxmlformats.org/markup-compatibility/2006" xmlns:mv="urn:schemas-microsoft-com:mac:vml" xmlns:p="http://schemas.openxmlformats.org/presentationml/2006/main" xmlns:c="http://schemas.openxmlformats.org/drawingml/2006/chart" xmlns:dgm="http://schemas.openxmlformats.org/drawingml/2006/diagram" xmlns:o="urn:schemas-microsoft-com:office:office" xmlns:v="urn:schemas-microsoft-com:vml" xmlns:pvml="urn:schemas-microsoft-com:office:powerpoint" xmlns:com="http://schemas.openxmlformats.org/drawingml/2006/compatibility" xmlns:p14="http://schemas.microsoft.com/office/powerpoint/2010/main" xmlns:p15="http://schemas.microsoft.com/office/powerpoint/2012/main" xmlns:ahyp="http://schemas.microsoft.com/office/drawing/2018/hyperlinkcolor">
+  <p:cSld>
+    <p:spTree>
+      <p:nvGrpSpPr>
+        <p:cNvPr id="71" name="Shape 71"/>
+        <p:cNvGrpSpPr/>
+        <p:nvPr/>
+      </p:nvGrpSpPr>
+      <p:grpSpPr>
+        <a:xfrm>
+          <a:off x="0" y="0"/>
+          <a:ext cx="0" cy="0"/>
+          <a:chOff x="0" y="0"/>
+          <a:chExt cx="0" cy="0"/>
+        </a:xfrm>
+      </p:grpSpPr>
+      <p:sp>
+        <p:nvSpPr>
+          <p:cNvPr id="72" name="Google Shape;72;p15"/>
           <p:cNvSpPr txBox="1"/>
           <p:nvPr>
             <p:ph type="title"/>
@@ -8358,7 +11215,7 @@
       </p:sp>
       <p:sp>
         <p:nvSpPr>
-          <p:cNvPr id="80" name="Google Shape;80;p16"/>
+          <p:cNvPr id="73" name="Google Shape;73;p15"/>
           <p:cNvSpPr txBox="1"/>
           <p:nvPr>
             <p:ph idx="1" type="body"/>
@@ -8486,12 +11343,12 @@
 </p:sld>
 </file>
 
-<file path=ppt/slides/slide5.xml><?xml version="1.0" encoding="utf-8"?>
+<file path=ppt/slides/slide4.xml><?xml version="1.0" encoding="utf-8"?>
 <p:sld xmlns:a="http://schemas.openxmlformats.org/drawingml/2006/main" xmlns:r="http://schemas.openxmlformats.org/officeDocument/2006/relationships" xmlns:mc="http://schemas.openxmlformats.org/markup-compatibility/2006" xmlns:mv="urn:schemas-microsoft-com:mac:vml" xmlns:p="http://schemas.openxmlformats.org/presentationml/2006/main" xmlns:c="http://schemas.openxmlformats.org/drawingml/2006/chart" xmlns:dgm="http://schemas.openxmlformats.org/drawingml/2006/diagram" xmlns:o="urn:schemas-microsoft-com:office:office" xmlns:v="urn:schemas-microsoft-com:vml" xmlns:pvml="urn:schemas-microsoft-com:office:powerpoint" xmlns:com="http://schemas.openxmlformats.org/drawingml/2006/compatibility" xmlns:p14="http://schemas.microsoft.com/office/powerpoint/2010/main" xmlns:p15="http://schemas.microsoft.com/office/powerpoint/2012/main" xmlns:ahyp="http://schemas.microsoft.com/office/drawing/2018/hyperlinkcolor">
   <p:cSld>
     <p:spTree>
       <p:nvGrpSpPr>
-        <p:cNvPr id="84" name="Shape 84"/>
+        <p:cNvPr id="77" name="Shape 77"/>
         <p:cNvGrpSpPr/>
         <p:nvPr/>
       </p:nvGrpSpPr>
@@ -8505,7 +11362,7 @@
       </p:grpSpPr>
       <p:sp>
         <p:nvSpPr>
-          <p:cNvPr id="85" name="Google Shape;85;p17"/>
+          <p:cNvPr id="78" name="Google Shape;78;p16"/>
           <p:cNvSpPr txBox="1"/>
           <p:nvPr>
             <p:ph type="title"/>
@@ -8551,12 +11408,12 @@
 </p:sld>
 </file>
 
-<file path=ppt/slides/slide6.xml><?xml version="1.0" encoding="utf-8"?>
+<file path=ppt/slides/slide5.xml><?xml version="1.0" encoding="utf-8"?>
 <p:sld xmlns:a="http://schemas.openxmlformats.org/drawingml/2006/main" xmlns:r="http://schemas.openxmlformats.org/officeDocument/2006/relationships" xmlns:mc="http://schemas.openxmlformats.org/markup-compatibility/2006" xmlns:mv="urn:schemas-microsoft-com:mac:vml" xmlns:p="http://schemas.openxmlformats.org/presentationml/2006/main" xmlns:c="http://schemas.openxmlformats.org/drawingml/2006/chart" xmlns:dgm="http://schemas.openxmlformats.org/drawingml/2006/diagram" xmlns:o="urn:schemas-microsoft-com:office:office" xmlns:v="urn:schemas-microsoft-com:vml" xmlns:pvml="urn:schemas-microsoft-com:office:powerpoint" xmlns:com="http://schemas.openxmlformats.org/drawingml/2006/compatibility" xmlns:p14="http://schemas.microsoft.com/office/powerpoint/2010/main" xmlns:p15="http://schemas.microsoft.com/office/powerpoint/2012/main" xmlns:ahyp="http://schemas.microsoft.com/office/drawing/2018/hyperlinkcolor">
   <p:cSld>
     <p:spTree>
       <p:nvGrpSpPr>
-        <p:cNvPr id="89" name="Shape 89"/>
+        <p:cNvPr id="82" name="Shape 82"/>
         <p:cNvGrpSpPr/>
         <p:nvPr/>
       </p:nvGrpSpPr>
@@ -8570,7 +11427,7 @@
       </p:grpSpPr>
       <p:pic>
         <p:nvPicPr>
-          <p:cNvPr id="90" name="Google Shape;90;p18"/>
+          <p:cNvPr id="83" name="Google Shape;83;p17"/>
           <p:cNvPicPr preferRelativeResize="0"/>
           <p:nvPr/>
         </p:nvPicPr>
@@ -8597,7 +11454,7 @@
       </p:pic>
       <p:pic>
         <p:nvPicPr>
-          <p:cNvPr id="91" name="Google Shape;91;p18"/>
+          <p:cNvPr id="84" name="Google Shape;84;p17"/>
           <p:cNvPicPr preferRelativeResize="0"/>
           <p:nvPr/>
         </p:nvPicPr>
@@ -8625,7 +11482,7 @@
       </p:pic>
       <p:sp>
         <p:nvSpPr>
-          <p:cNvPr id="92" name="Google Shape;92;p18"/>
+          <p:cNvPr id="85" name="Google Shape;85;p17"/>
           <p:cNvSpPr txBox="1"/>
           <p:nvPr>
             <p:ph type="title"/>
@@ -8666,7 +11523,7 @@
       </p:sp>
       <p:sp>
         <p:nvSpPr>
-          <p:cNvPr id="93" name="Google Shape;93;p18"/>
+          <p:cNvPr id="86" name="Google Shape;86;p17"/>
           <p:cNvSpPr txBox="1"/>
           <p:nvPr/>
         </p:nvSpPr>
@@ -8719,7 +11576,7 @@
       </p:sp>
       <p:sp>
         <p:nvSpPr>
-          <p:cNvPr id="94" name="Google Shape;94;p18"/>
+          <p:cNvPr id="87" name="Google Shape;87;p17"/>
           <p:cNvSpPr txBox="1"/>
           <p:nvPr>
             <p:ph idx="1" type="body"/>
@@ -8763,7 +11620,7 @@
       </p:sp>
       <p:cxnSp>
         <p:nvCxnSpPr>
-          <p:cNvPr id="95" name="Google Shape;95;p18"/>
+          <p:cNvPr id="88" name="Google Shape;88;p17"/>
           <p:cNvCxnSpPr/>
           <p:nvPr/>
         </p:nvCxnSpPr>
@@ -8789,7 +11646,7 @@
       </p:cxnSp>
       <p:sp>
         <p:nvSpPr>
-          <p:cNvPr id="96" name="Google Shape;96;p18"/>
+          <p:cNvPr id="89" name="Google Shape;89;p17"/>
           <p:cNvSpPr txBox="1"/>
           <p:nvPr>
             <p:ph type="title"/>
@@ -8836,12 +11693,12 @@
 </p:sld>
 </file>
 
-<file path=ppt/slides/slide7.xml><?xml version="1.0" encoding="utf-8"?>
+<file path=ppt/slides/slide6.xml><?xml version="1.0" encoding="utf-8"?>
 <p:sld xmlns:a="http://schemas.openxmlformats.org/drawingml/2006/main" xmlns:r="http://schemas.openxmlformats.org/officeDocument/2006/relationships" xmlns:mc="http://schemas.openxmlformats.org/markup-compatibility/2006" xmlns:mv="urn:schemas-microsoft-com:mac:vml" xmlns:p="http://schemas.openxmlformats.org/presentationml/2006/main" xmlns:c="http://schemas.openxmlformats.org/drawingml/2006/chart" xmlns:dgm="http://schemas.openxmlformats.org/drawingml/2006/diagram" xmlns:o="urn:schemas-microsoft-com:office:office" xmlns:v="urn:schemas-microsoft-com:vml" xmlns:pvml="urn:schemas-microsoft-com:office:powerpoint" xmlns:com="http://schemas.openxmlformats.org/drawingml/2006/compatibility" xmlns:p14="http://schemas.microsoft.com/office/powerpoint/2010/main" xmlns:p15="http://schemas.microsoft.com/office/powerpoint/2012/main" xmlns:ahyp="http://schemas.microsoft.com/office/drawing/2018/hyperlinkcolor">
   <p:cSld>
     <p:spTree>
       <p:nvGrpSpPr>
-        <p:cNvPr id="100" name="Shape 100"/>
+        <p:cNvPr id="93" name="Shape 93"/>
         <p:cNvGrpSpPr/>
         <p:nvPr/>
       </p:nvGrpSpPr>
@@ -8855,7 +11712,7 @@
       </p:grpSpPr>
       <p:sp>
         <p:nvSpPr>
-          <p:cNvPr id="101" name="Google Shape;101;p19"/>
+          <p:cNvPr id="94" name="Google Shape;94;p18"/>
           <p:cNvSpPr txBox="1"/>
           <p:nvPr>
             <p:ph type="title"/>
@@ -8896,7 +11753,7 @@
       </p:sp>
       <p:pic>
         <p:nvPicPr>
-          <p:cNvPr id="102" name="Google Shape;102;p19"/>
+          <p:cNvPr id="95" name="Google Shape;95;p18"/>
           <p:cNvPicPr preferRelativeResize="0"/>
           <p:nvPr/>
         </p:nvPicPr>
@@ -8924,7 +11781,7 @@
       </p:pic>
       <p:sp>
         <p:nvSpPr>
-          <p:cNvPr id="103" name="Google Shape;103;p19"/>
+          <p:cNvPr id="96" name="Google Shape;96;p18"/>
           <p:cNvSpPr txBox="1"/>
           <p:nvPr/>
         </p:nvSpPr>
@@ -9145,7 +12002,7 @@
       </p:sp>
       <p:sp>
         <p:nvSpPr>
-          <p:cNvPr id="104" name="Google Shape;104;p19"/>
+          <p:cNvPr id="97" name="Google Shape;97;p18"/>
           <p:cNvSpPr txBox="1"/>
           <p:nvPr>
             <p:ph type="title"/>
@@ -9203,12 +12060,12 @@
 </p:sld>
 </file>
 
-<file path=ppt/slides/slide8.xml><?xml version="1.0" encoding="utf-8"?>
+<file path=ppt/slides/slide7.xml><?xml version="1.0" encoding="utf-8"?>
 <p:sld xmlns:a="http://schemas.openxmlformats.org/drawingml/2006/main" xmlns:r="http://schemas.openxmlformats.org/officeDocument/2006/relationships" xmlns:mc="http://schemas.openxmlformats.org/markup-compatibility/2006" xmlns:mv="urn:schemas-microsoft-com:mac:vml" xmlns:p="http://schemas.openxmlformats.org/presentationml/2006/main" xmlns:c="http://schemas.openxmlformats.org/drawingml/2006/chart" xmlns:dgm="http://schemas.openxmlformats.org/drawingml/2006/diagram" xmlns:o="urn:schemas-microsoft-com:office:office" xmlns:v="urn:schemas-microsoft-com:vml" xmlns:pvml="urn:schemas-microsoft-com:office:powerpoint" xmlns:com="http://schemas.openxmlformats.org/drawingml/2006/compatibility" xmlns:p14="http://schemas.microsoft.com/office/powerpoint/2010/main" xmlns:p15="http://schemas.microsoft.com/office/powerpoint/2012/main" xmlns:ahyp="http://schemas.microsoft.com/office/drawing/2018/hyperlinkcolor">
   <p:cSld>
     <p:spTree>
       <p:nvGrpSpPr>
-        <p:cNvPr id="108" name="Shape 108"/>
+        <p:cNvPr id="101" name="Shape 101"/>
         <p:cNvGrpSpPr/>
         <p:nvPr/>
       </p:nvGrpSpPr>
@@ -9222,7 +12079,7 @@
       </p:grpSpPr>
       <p:sp>
         <p:nvSpPr>
-          <p:cNvPr id="109" name="Google Shape;109;p20"/>
+          <p:cNvPr id="102" name="Google Shape;102;p19"/>
           <p:cNvSpPr txBox="1"/>
           <p:nvPr>
             <p:ph type="title"/>
@@ -9268,12 +12125,12 @@
 </p:sld>
 </file>
 
-<file path=ppt/slides/slide9.xml><?xml version="1.0" encoding="utf-8"?>
+<file path=ppt/slides/slide8.xml><?xml version="1.0" encoding="utf-8"?>
 <p:sld xmlns:a="http://schemas.openxmlformats.org/drawingml/2006/main" xmlns:r="http://schemas.openxmlformats.org/officeDocument/2006/relationships" xmlns:mc="http://schemas.openxmlformats.org/markup-compatibility/2006" xmlns:mv="urn:schemas-microsoft-com:mac:vml" xmlns:p="http://schemas.openxmlformats.org/presentationml/2006/main" xmlns:c="http://schemas.openxmlformats.org/drawingml/2006/chart" xmlns:dgm="http://schemas.openxmlformats.org/drawingml/2006/diagram" xmlns:o="urn:schemas-microsoft-com:office:office" xmlns:v="urn:schemas-microsoft-com:vml" xmlns:pvml="urn:schemas-microsoft-com:office:powerpoint" xmlns:com="http://schemas.openxmlformats.org/drawingml/2006/compatibility" xmlns:p14="http://schemas.microsoft.com/office/powerpoint/2010/main" xmlns:p15="http://schemas.microsoft.com/office/powerpoint/2012/main" xmlns:ahyp="http://schemas.microsoft.com/office/drawing/2018/hyperlinkcolor">
   <p:cSld>
     <p:spTree>
       <p:nvGrpSpPr>
-        <p:cNvPr id="113" name="Shape 113"/>
+        <p:cNvPr id="106" name="Shape 106"/>
         <p:cNvGrpSpPr/>
         <p:nvPr/>
       </p:nvGrpSpPr>
@@ -9287,7 +12144,7 @@
       </p:grpSpPr>
       <p:sp>
         <p:nvSpPr>
-          <p:cNvPr id="114" name="Google Shape;114;p21"/>
+          <p:cNvPr id="107" name="Google Shape;107;p20"/>
           <p:cNvSpPr txBox="1"/>
           <p:nvPr>
             <p:ph type="title"/>
@@ -9328,7 +12185,7 @@
       </p:sp>
       <p:pic>
         <p:nvPicPr>
-          <p:cNvPr id="115" name="Google Shape;115;p21"/>
+          <p:cNvPr id="108" name="Google Shape;108;p20"/>
           <p:cNvPicPr preferRelativeResize="0"/>
           <p:nvPr/>
         </p:nvPicPr>
@@ -9356,7 +12213,7 @@
       </p:pic>
       <p:pic>
         <p:nvPicPr>
-          <p:cNvPr id="116" name="Google Shape;116;p21"/>
+          <p:cNvPr id="109" name="Google Shape;109;p20"/>
           <p:cNvPicPr preferRelativeResize="0"/>
           <p:nvPr/>
         </p:nvPicPr>
@@ -9384,7 +12241,7 @@
       </p:pic>
       <p:pic>
         <p:nvPicPr>
-          <p:cNvPr id="117" name="Google Shape;117;p21"/>
+          <p:cNvPr id="110" name="Google Shape;110;p20"/>
           <p:cNvPicPr preferRelativeResize="0"/>
           <p:nvPr/>
         </p:nvPicPr>
@@ -9412,7 +12269,7 @@
       </p:pic>
       <p:pic>
         <p:nvPicPr>
-          <p:cNvPr id="118" name="Google Shape;118;p21"/>
+          <p:cNvPr id="111" name="Google Shape;111;p20"/>
           <p:cNvPicPr preferRelativeResize="0"/>
           <p:nvPr/>
         </p:nvPicPr>
@@ -9438,6 +12295,180 @@
           </a:ln>
         </p:spPr>
       </p:pic>
+    </p:spTree>
+  </p:cSld>
+  <p:clrMapOvr>
+    <a:masterClrMapping/>
+  </p:clrMapOvr>
+</p:sld>
+</file>
+
+<file path=ppt/slides/slide9.xml><?xml version="1.0" encoding="utf-8"?>
+<p:sld xmlns:a="http://schemas.openxmlformats.org/drawingml/2006/main" xmlns:r="http://schemas.openxmlformats.org/officeDocument/2006/relationships" xmlns:mc="http://schemas.openxmlformats.org/markup-compatibility/2006" xmlns:mv="urn:schemas-microsoft-com:mac:vml" xmlns:p="http://schemas.openxmlformats.org/presentationml/2006/main" xmlns:c="http://schemas.openxmlformats.org/drawingml/2006/chart" xmlns:dgm="http://schemas.openxmlformats.org/drawingml/2006/diagram" xmlns:o="urn:schemas-microsoft-com:office:office" xmlns:v="urn:schemas-microsoft-com:vml" xmlns:pvml="urn:schemas-microsoft-com:office:powerpoint" xmlns:com="http://schemas.openxmlformats.org/drawingml/2006/compatibility" xmlns:p14="http://schemas.microsoft.com/office/powerpoint/2010/main" xmlns:p15="http://schemas.microsoft.com/office/powerpoint/2012/main" xmlns:ahyp="http://schemas.microsoft.com/office/drawing/2018/hyperlinkcolor">
+  <p:cSld>
+    <p:spTree>
+      <p:nvGrpSpPr>
+        <p:cNvPr id="115" name="Shape 115"/>
+        <p:cNvGrpSpPr/>
+        <p:nvPr/>
+      </p:nvGrpSpPr>
+      <p:grpSpPr>
+        <a:xfrm>
+          <a:off x="0" y="0"/>
+          <a:ext cx="0" cy="0"/>
+          <a:chOff x="0" y="0"/>
+          <a:chExt cx="0" cy="0"/>
+        </a:xfrm>
+      </p:grpSpPr>
+      <p:sp>
+        <p:nvSpPr>
+          <p:cNvPr id="116" name="Google Shape;116;p21"/>
+          <p:cNvSpPr txBox="1"/>
+          <p:nvPr>
+            <p:ph type="title"/>
+          </p:nvPr>
+        </p:nvSpPr>
+        <p:spPr>
+          <a:xfrm>
+            <a:off x="1297200" y="50400"/>
+            <a:ext cx="6276000" cy="586500"/>
+          </a:xfrm>
+          <a:prstGeom prst="rect">
+            <a:avLst/>
+          </a:prstGeom>
+        </p:spPr>
+        <p:txBody>
+          <a:bodyPr anchorCtr="0" anchor="t" bIns="91425" lIns="91425" spcFirstLastPara="1" rIns="91425" wrap="square" tIns="91425">
+            <a:noAutofit/>
+          </a:bodyPr>
+          <a:lstStyle/>
+          <a:p>
+            <a:pPr indent="0" lvl="0" marL="0" rtl="0" algn="ctr">
+              <a:spcBef>
+                <a:spcPts val="0"/>
+              </a:spcBef>
+              <a:spcAft>
+                <a:spcPts val="0"/>
+              </a:spcAft>
+              <a:buSzPts val="990"/>
+              <a:buNone/>
+            </a:pPr>
+            <a:r>
+              <a:rPr b="1" lang="es" sz="2720"/>
+              <a:t>Ubicación de los inmuebles publicados</a:t>
+            </a:r>
+            <a:endParaRPr b="1" sz="2720"/>
+          </a:p>
+        </p:txBody>
+      </p:sp>
+      <p:pic>
+        <p:nvPicPr>
+          <p:cNvPr id="117" name="Google Shape;117;p21"/>
+          <p:cNvPicPr preferRelativeResize="0"/>
+          <p:nvPr/>
+        </p:nvPicPr>
+        <p:blipFill>
+          <a:blip r:embed="rId3">
+            <a:alphaModFix/>
+          </a:blip>
+          <a:stretch>
+            <a:fillRect/>
+          </a:stretch>
+        </p:blipFill>
+        <p:spPr>
+          <a:xfrm>
+            <a:off x="1161450" y="636900"/>
+            <a:ext cx="2238402" cy="4201801"/>
+          </a:xfrm>
+          <a:prstGeom prst="rect">
+            <a:avLst/>
+          </a:prstGeom>
+          <a:noFill/>
+          <a:ln>
+            <a:noFill/>
+          </a:ln>
+        </p:spPr>
+      </p:pic>
+      <p:pic>
+        <p:nvPicPr>
+          <p:cNvPr id="118" name="Google Shape;118;p21"/>
+          <p:cNvPicPr preferRelativeResize="0"/>
+          <p:nvPr/>
+        </p:nvPicPr>
+        <p:blipFill>
+          <a:blip r:embed="rId4">
+            <a:alphaModFix/>
+          </a:blip>
+          <a:stretch>
+            <a:fillRect/>
+          </a:stretch>
+        </p:blipFill>
+        <p:spPr>
+          <a:xfrm>
+            <a:off x="4375852" y="1333125"/>
+            <a:ext cx="3448050" cy="3333750"/>
+          </a:xfrm>
+          <a:prstGeom prst="rect">
+            <a:avLst/>
+          </a:prstGeom>
+          <a:noFill/>
+          <a:ln>
+            <a:noFill/>
+          </a:ln>
+        </p:spPr>
+      </p:pic>
+      <p:sp>
+        <p:nvSpPr>
+          <p:cNvPr id="119" name="Google Shape;119;p21"/>
+          <p:cNvSpPr txBox="1"/>
+          <p:nvPr/>
+        </p:nvSpPr>
+        <p:spPr>
+          <a:xfrm>
+            <a:off x="4700825" y="746625"/>
+            <a:ext cx="2798100" cy="586500"/>
+          </a:xfrm>
+          <a:prstGeom prst="rect">
+            <a:avLst/>
+          </a:prstGeom>
+          <a:noFill/>
+          <a:ln>
+            <a:noFill/>
+          </a:ln>
+        </p:spPr>
+        <p:txBody>
+          <a:bodyPr anchorCtr="0" anchor="t" bIns="91425" lIns="91425" spcFirstLastPara="1" rIns="91425" wrap="square" tIns="91425">
+            <a:noAutofit/>
+          </a:bodyPr>
+          <a:lstStyle/>
+          <a:p>
+            <a:pPr indent="0" lvl="0" marL="0" rtl="0" algn="ctr">
+              <a:spcBef>
+                <a:spcPts val="0"/>
+              </a:spcBef>
+              <a:spcAft>
+                <a:spcPts val="0"/>
+              </a:spcAft>
+              <a:buNone/>
+            </a:pPr>
+            <a:r>
+              <a:rPr lang="es">
+                <a:latin typeface="Proxima Nova"/>
+                <a:ea typeface="Proxima Nova"/>
+                <a:cs typeface="Proxima Nova"/>
+                <a:sym typeface="Proxima Nova"/>
+              </a:rPr>
+              <a:t>Área Metropolitana de Buenos Aires</a:t>
+            </a:r>
+            <a:endParaRPr>
+              <a:latin typeface="Proxima Nova"/>
+              <a:ea typeface="Proxima Nova"/>
+              <a:cs typeface="Proxima Nova"/>
+              <a:sym typeface="Proxima Nova"/>
+            </a:endParaRPr>
+          </a:p>
+        </p:txBody>
+      </p:sp>
     </p:spTree>
   </p:cSld>
   <p:clrMapOvr>

</xml_diff>